<commit_message>
Updated entity framework example
</commit_message>
<xml_diff>
--- a/8.EntityFramework/EntityFramework.pptx
+++ b/8.EntityFramework/EntityFramework.pptx
@@ -5,33 +5,37 @@
     <p:sldMasterId id="2147483661" r:id="rId1"/>
   </p:sldMasterIdLst>
   <p:notesMasterIdLst>
-    <p:notesMasterId r:id="rId9"/>
+    <p:notesMasterId r:id="rId13"/>
   </p:notesMasterIdLst>
   <p:sldIdLst>
     <p:sldId id="256" r:id="rId2"/>
     <p:sldId id="259" r:id="rId3"/>
     <p:sldId id="269" r:id="rId4"/>
     <p:sldId id="270" r:id="rId5"/>
-    <p:sldId id="272" r:id="rId6"/>
+    <p:sldId id="276" r:id="rId6"/>
     <p:sldId id="274" r:id="rId7"/>
-    <p:sldId id="275" r:id="rId8"/>
+    <p:sldId id="277" r:id="rId8"/>
+    <p:sldId id="278" r:id="rId9"/>
+    <p:sldId id="279" r:id="rId10"/>
+    <p:sldId id="280" r:id="rId11"/>
+    <p:sldId id="275" r:id="rId12"/>
   </p:sldIdLst>
   <p:sldSz cx="9144000" cy="6858000" type="screen4x3"/>
   <p:notesSz cx="6858000" cy="9144000"/>
   <p:embeddedFontLst>
     <p:embeddedFont>
       <p:font typeface="Calibri" panose="020F0502020204030204" pitchFamily="34" charset="0"/>
-      <p:regular r:id="rId10"/>
-      <p:bold r:id="rId11"/>
-      <p:italic r:id="rId12"/>
-      <p:boldItalic r:id="rId13"/>
-    </p:embeddedFont>
-    <p:embeddedFont>
-      <p:font typeface="Roboto" panose="020B0604020202020204" charset="0"/>
       <p:regular r:id="rId14"/>
       <p:bold r:id="rId15"/>
       <p:italic r:id="rId16"/>
       <p:boldItalic r:id="rId17"/>
+    </p:embeddedFont>
+    <p:embeddedFont>
+      <p:font typeface="Roboto" panose="020B0604020202020204" charset="0"/>
+      <p:regular r:id="rId18"/>
+      <p:bold r:id="rId19"/>
+      <p:italic r:id="rId20"/>
+      <p:boldItalic r:id="rId21"/>
     </p:embeddedFont>
   </p:embeddedFontLst>
   <p:defaultTextStyle>
@@ -1480,6 +1484,416 @@
 </p:notes>
 </file>
 
+<file path=ppt/notesSlides/notesSlide10.xml><?xml version="1.0" encoding="utf-8"?>
+<p:notes xmlns:a="http://schemas.openxmlformats.org/drawingml/2006/main" xmlns:r="http://schemas.openxmlformats.org/officeDocument/2006/relationships" xmlns:p="http://schemas.openxmlformats.org/presentationml/2006/main" showMasterSp="0" showMasterPhAnim="0">
+  <p:cSld>
+    <p:spTree>
+      <p:nvGrpSpPr>
+        <p:cNvPr id="1" name="Shape 152"/>
+        <p:cNvGrpSpPr/>
+        <p:nvPr/>
+      </p:nvGrpSpPr>
+      <p:grpSpPr>
+        <a:xfrm>
+          <a:off x="0" y="0"/>
+          <a:ext cx="0" cy="0"/>
+          <a:chOff x="0" y="0"/>
+          <a:chExt cx="0" cy="0"/>
+        </a:xfrm>
+      </p:grpSpPr>
+      <p:sp>
+        <p:nvSpPr>
+          <p:cNvPr id="153" name="Shape 153"/>
+          <p:cNvSpPr>
+            <a:spLocks noGrp="1" noRot="1" noChangeAspect="1"/>
+          </p:cNvSpPr>
+          <p:nvPr>
+            <p:ph type="sldImg" idx="2"/>
+          </p:nvPr>
+        </p:nvSpPr>
+        <p:spPr>
+          <a:xfrm>
+            <a:off x="1143000" y="685800"/>
+            <a:ext cx="4572000" cy="3429000"/>
+          </a:xfrm>
+          <a:custGeom>
+            <a:avLst/>
+            <a:gdLst/>
+            <a:ahLst/>
+            <a:cxnLst/>
+            <a:rect l="0" t="0" r="0" b="0"/>
+            <a:pathLst>
+              <a:path w="120000" h="120000" extrusionOk="0">
+                <a:moveTo>
+                  <a:pt x="0" y="0"/>
+                </a:moveTo>
+                <a:lnTo>
+                  <a:pt x="120000" y="0"/>
+                </a:lnTo>
+                <a:lnTo>
+                  <a:pt x="120000" y="120000"/>
+                </a:lnTo>
+                <a:lnTo>
+                  <a:pt x="0" y="120000"/>
+                </a:lnTo>
+                <a:close/>
+              </a:path>
+            </a:pathLst>
+          </a:custGeom>
+          <a:noFill/>
+          <a:ln w="9525" cap="flat" cmpd="sng">
+            <a:solidFill>
+              <a:srgbClr val="000000"/>
+            </a:solidFill>
+            <a:prstDash val="solid"/>
+            <a:miter lim="800000"/>
+            <a:headEnd type="none" w="med" len="med"/>
+            <a:tailEnd type="none" w="med" len="med"/>
+          </a:ln>
+        </p:spPr>
+      </p:sp>
+      <p:sp>
+        <p:nvSpPr>
+          <p:cNvPr id="154" name="Shape 154"/>
+          <p:cNvSpPr txBox="1">
+            <a:spLocks noGrp="1"/>
+          </p:cNvSpPr>
+          <p:nvPr>
+            <p:ph type="body" idx="1"/>
+          </p:nvPr>
+        </p:nvSpPr>
+        <p:spPr>
+          <a:xfrm>
+            <a:off x="685800" y="4343400"/>
+            <a:ext cx="5486400" cy="4114800"/>
+          </a:xfrm>
+          <a:prstGeom prst="rect">
+            <a:avLst/>
+          </a:prstGeom>
+          <a:noFill/>
+          <a:ln>
+            <a:noFill/>
+          </a:ln>
+        </p:spPr>
+        <p:txBody>
+          <a:bodyPr spcFirstLastPara="1" wrap="square" lIns="91425" tIns="45700" rIns="91425" bIns="45700" anchor="t" anchorCtr="0">
+            <a:noAutofit/>
+          </a:bodyPr>
+          <a:lstStyle/>
+          <a:p>
+            <a:pPr marL="0" marR="0" lvl="0" indent="0" algn="l" rtl="0">
+              <a:spcBef>
+                <a:spcPts val="0"/>
+              </a:spcBef>
+              <a:spcAft>
+                <a:spcPts val="0"/>
+              </a:spcAft>
+              <a:buNone/>
+            </a:pPr>
+            <a:endParaRPr sz="1200" b="0" i="0" u="none" strike="noStrike" cap="none" dirty="0">
+              <a:solidFill>
+                <a:schemeClr val="dk1"/>
+              </a:solidFill>
+              <a:latin typeface="Calibri"/>
+              <a:ea typeface="Calibri"/>
+              <a:cs typeface="Calibri"/>
+              <a:sym typeface="Calibri"/>
+            </a:endParaRPr>
+          </a:p>
+        </p:txBody>
+      </p:sp>
+      <p:sp>
+        <p:nvSpPr>
+          <p:cNvPr id="155" name="Shape 155"/>
+          <p:cNvSpPr txBox="1">
+            <a:spLocks noGrp="1"/>
+          </p:cNvSpPr>
+          <p:nvPr>
+            <p:ph type="sldNum" idx="12"/>
+          </p:nvPr>
+        </p:nvSpPr>
+        <p:spPr>
+          <a:xfrm>
+            <a:off x="3884613" y="8685213"/>
+            <a:ext cx="2971800" cy="457200"/>
+          </a:xfrm>
+          <a:prstGeom prst="rect">
+            <a:avLst/>
+          </a:prstGeom>
+          <a:noFill/>
+          <a:ln>
+            <a:noFill/>
+          </a:ln>
+        </p:spPr>
+        <p:txBody>
+          <a:bodyPr spcFirstLastPara="1" wrap="square" lIns="91425" tIns="45700" rIns="91425" bIns="45700" anchor="b" anchorCtr="0">
+            <a:noAutofit/>
+          </a:bodyPr>
+          <a:lstStyle/>
+          <a:p>
+            <a:pPr marL="0" marR="0" lvl="0" indent="0" algn="r" rtl="0">
+              <a:spcBef>
+                <a:spcPts val="0"/>
+              </a:spcBef>
+              <a:spcAft>
+                <a:spcPts val="0"/>
+              </a:spcAft>
+              <a:buNone/>
+            </a:pPr>
+            <a:fld id="{00000000-1234-1234-1234-123412341234}" type="slidenum">
+              <a:rPr lang="en-US" sz="1200" b="0" i="0" u="none" strike="noStrike" cap="none">
+                <a:solidFill>
+                  <a:schemeClr val="dk1"/>
+                </a:solidFill>
+                <a:latin typeface="Calibri"/>
+                <a:ea typeface="Calibri"/>
+                <a:cs typeface="Calibri"/>
+                <a:sym typeface="Calibri"/>
+              </a:rPr>
+              <a:t>10</a:t>
+            </a:fld>
+            <a:endParaRPr sz="1200" b="0" i="0" u="none" strike="noStrike" cap="none">
+              <a:solidFill>
+                <a:schemeClr val="dk1"/>
+              </a:solidFill>
+              <a:latin typeface="Calibri"/>
+              <a:ea typeface="Calibri"/>
+              <a:cs typeface="Calibri"/>
+              <a:sym typeface="Calibri"/>
+            </a:endParaRPr>
+          </a:p>
+        </p:txBody>
+      </p:sp>
+    </p:spTree>
+    <p:extLst>
+      <p:ext uri="{BB962C8B-B14F-4D97-AF65-F5344CB8AC3E}">
+        <p14:creationId xmlns:p14="http://schemas.microsoft.com/office/powerpoint/2010/main" val="2226572528"/>
+      </p:ext>
+    </p:extLst>
+  </p:cSld>
+  <p:clrMapOvr>
+    <a:masterClrMapping/>
+  </p:clrMapOvr>
+</p:notes>
+</file>
+
+<file path=ppt/notesSlides/notesSlide11.xml><?xml version="1.0" encoding="utf-8"?>
+<p:notes xmlns:a="http://schemas.openxmlformats.org/drawingml/2006/main" xmlns:r="http://schemas.openxmlformats.org/officeDocument/2006/relationships" xmlns:p="http://schemas.openxmlformats.org/presentationml/2006/main" showMasterSp="0" showMasterPhAnim="0">
+  <p:cSld>
+    <p:spTree>
+      <p:nvGrpSpPr>
+        <p:cNvPr id="1" name="Shape 152"/>
+        <p:cNvGrpSpPr/>
+        <p:nvPr/>
+      </p:nvGrpSpPr>
+      <p:grpSpPr>
+        <a:xfrm>
+          <a:off x="0" y="0"/>
+          <a:ext cx="0" cy="0"/>
+          <a:chOff x="0" y="0"/>
+          <a:chExt cx="0" cy="0"/>
+        </a:xfrm>
+      </p:grpSpPr>
+      <p:sp>
+        <p:nvSpPr>
+          <p:cNvPr id="153" name="Shape 153"/>
+          <p:cNvSpPr>
+            <a:spLocks noGrp="1" noRot="1" noChangeAspect="1"/>
+          </p:cNvSpPr>
+          <p:nvPr>
+            <p:ph type="sldImg" idx="2"/>
+          </p:nvPr>
+        </p:nvSpPr>
+        <p:spPr>
+          <a:xfrm>
+            <a:off x="1143000" y="685800"/>
+            <a:ext cx="4572000" cy="3429000"/>
+          </a:xfrm>
+          <a:custGeom>
+            <a:avLst/>
+            <a:gdLst/>
+            <a:ahLst/>
+            <a:cxnLst/>
+            <a:rect l="0" t="0" r="0" b="0"/>
+            <a:pathLst>
+              <a:path w="120000" h="120000" extrusionOk="0">
+                <a:moveTo>
+                  <a:pt x="0" y="0"/>
+                </a:moveTo>
+                <a:lnTo>
+                  <a:pt x="120000" y="0"/>
+                </a:lnTo>
+                <a:lnTo>
+                  <a:pt x="120000" y="120000"/>
+                </a:lnTo>
+                <a:lnTo>
+                  <a:pt x="0" y="120000"/>
+                </a:lnTo>
+                <a:close/>
+              </a:path>
+            </a:pathLst>
+          </a:custGeom>
+          <a:noFill/>
+          <a:ln w="9525" cap="flat" cmpd="sng">
+            <a:solidFill>
+              <a:srgbClr val="000000"/>
+            </a:solidFill>
+            <a:prstDash val="solid"/>
+            <a:miter lim="800000"/>
+            <a:headEnd type="none" w="med" len="med"/>
+            <a:tailEnd type="none" w="med" len="med"/>
+          </a:ln>
+        </p:spPr>
+      </p:sp>
+      <p:sp>
+        <p:nvSpPr>
+          <p:cNvPr id="154" name="Shape 154"/>
+          <p:cNvSpPr txBox="1">
+            <a:spLocks noGrp="1"/>
+          </p:cNvSpPr>
+          <p:nvPr>
+            <p:ph type="body" idx="1"/>
+          </p:nvPr>
+        </p:nvSpPr>
+        <p:spPr>
+          <a:xfrm>
+            <a:off x="685800" y="4343400"/>
+            <a:ext cx="5486400" cy="4114800"/>
+          </a:xfrm>
+          <a:prstGeom prst="rect">
+            <a:avLst/>
+          </a:prstGeom>
+          <a:noFill/>
+          <a:ln>
+            <a:noFill/>
+          </a:ln>
+        </p:spPr>
+        <p:txBody>
+          <a:bodyPr spcFirstLastPara="1" wrap="square" lIns="91425" tIns="45700" rIns="91425" bIns="45700" anchor="t" anchorCtr="0">
+            <a:noAutofit/>
+          </a:bodyPr>
+          <a:lstStyle/>
+          <a:p>
+            <a:pPr marL="0" marR="0" lvl="0" indent="0" algn="l" rtl="0">
+              <a:spcBef>
+                <a:spcPts val="0"/>
+              </a:spcBef>
+              <a:spcAft>
+                <a:spcPts val="0"/>
+              </a:spcAft>
+              <a:buNone/>
+            </a:pPr>
+            <a:r>
+              <a:rPr lang="ru-RU" sz="1200" b="0" i="0" u="none" strike="noStrike" cap="none" dirty="0">
+                <a:solidFill>
+                  <a:schemeClr val="dk1"/>
+                </a:solidFill>
+                <a:latin typeface="Calibri"/>
+                <a:ea typeface="Calibri"/>
+                <a:cs typeface="Calibri"/>
+                <a:sym typeface="Calibri"/>
+              </a:rPr>
+              <a:t>Переходим в код и рассматривает примеры с</a:t>
+            </a:r>
+            <a:r>
+              <a:rPr lang="en-US" sz="1200" b="0" i="0" u="none" strike="noStrike" cap="none" dirty="0">
+                <a:solidFill>
+                  <a:schemeClr val="dk1"/>
+                </a:solidFill>
+                <a:latin typeface="Calibri"/>
+                <a:ea typeface="Calibri"/>
+                <a:cs typeface="Calibri"/>
+                <a:sym typeface="Calibri"/>
+              </a:rPr>
+              <a:t> LINQ to SQL</a:t>
+            </a:r>
+            <a:endParaRPr sz="1200" b="0" i="0" u="none" strike="noStrike" cap="none" dirty="0">
+              <a:solidFill>
+                <a:schemeClr val="dk1"/>
+              </a:solidFill>
+              <a:latin typeface="Calibri"/>
+              <a:ea typeface="Calibri"/>
+              <a:cs typeface="Calibri"/>
+              <a:sym typeface="Calibri"/>
+            </a:endParaRPr>
+          </a:p>
+        </p:txBody>
+      </p:sp>
+      <p:sp>
+        <p:nvSpPr>
+          <p:cNvPr id="155" name="Shape 155"/>
+          <p:cNvSpPr txBox="1">
+            <a:spLocks noGrp="1"/>
+          </p:cNvSpPr>
+          <p:nvPr>
+            <p:ph type="sldNum" idx="12"/>
+          </p:nvPr>
+        </p:nvSpPr>
+        <p:spPr>
+          <a:xfrm>
+            <a:off x="3884613" y="8685213"/>
+            <a:ext cx="2971800" cy="457200"/>
+          </a:xfrm>
+          <a:prstGeom prst="rect">
+            <a:avLst/>
+          </a:prstGeom>
+          <a:noFill/>
+          <a:ln>
+            <a:noFill/>
+          </a:ln>
+        </p:spPr>
+        <p:txBody>
+          <a:bodyPr spcFirstLastPara="1" wrap="square" lIns="91425" tIns="45700" rIns="91425" bIns="45700" anchor="b" anchorCtr="0">
+            <a:noAutofit/>
+          </a:bodyPr>
+          <a:lstStyle/>
+          <a:p>
+            <a:pPr marL="0" marR="0" lvl="0" indent="0" algn="r" rtl="0">
+              <a:spcBef>
+                <a:spcPts val="0"/>
+              </a:spcBef>
+              <a:spcAft>
+                <a:spcPts val="0"/>
+              </a:spcAft>
+              <a:buNone/>
+            </a:pPr>
+            <a:fld id="{00000000-1234-1234-1234-123412341234}" type="slidenum">
+              <a:rPr lang="en-US" sz="1200" b="0" i="0" u="none" strike="noStrike" cap="none">
+                <a:solidFill>
+                  <a:schemeClr val="dk1"/>
+                </a:solidFill>
+                <a:latin typeface="Calibri"/>
+                <a:ea typeface="Calibri"/>
+                <a:cs typeface="Calibri"/>
+                <a:sym typeface="Calibri"/>
+              </a:rPr>
+              <a:t>11</a:t>
+            </a:fld>
+            <a:endParaRPr sz="1200" b="0" i="0" u="none" strike="noStrike" cap="none">
+              <a:solidFill>
+                <a:schemeClr val="dk1"/>
+              </a:solidFill>
+              <a:latin typeface="Calibri"/>
+              <a:ea typeface="Calibri"/>
+              <a:cs typeface="Calibri"/>
+              <a:sym typeface="Calibri"/>
+            </a:endParaRPr>
+          </a:p>
+        </p:txBody>
+      </p:sp>
+    </p:spTree>
+    <p:extLst>
+      <p:ext uri="{BB962C8B-B14F-4D97-AF65-F5344CB8AC3E}">
+        <p14:creationId xmlns:p14="http://schemas.microsoft.com/office/powerpoint/2010/main" val="2807150285"/>
+      </p:ext>
+    </p:extLst>
+  </p:cSld>
+  <p:clrMapOvr>
+    <a:masterClrMapping/>
+  </p:clrMapOvr>
+</p:notes>
+</file>
+
 <file path=ppt/notesSlides/notesSlide2.xml><?xml version="1.0" encoding="utf-8"?>
 <p:notes xmlns:a="http://schemas.openxmlformats.org/drawingml/2006/main" xmlns:r="http://schemas.openxmlformats.org/officeDocument/2006/relationships" xmlns:p="http://schemas.openxmlformats.org/presentationml/2006/main" showMasterSp="0" showMasterPhAnim="0">
   <p:cSld>
@@ -2712,31 +3126,7 @@
               </a:spcAft>
               <a:buNone/>
             </a:pPr>
-            <a:r>
-              <a:rPr lang="ru-RU" sz="1200" b="0" i="0" u="none" strike="noStrike" cap="none" dirty="0">
-                <a:solidFill>
-                  <a:schemeClr val="dk1"/>
-                </a:solidFill>
-                <a:latin typeface="Calibri"/>
-                <a:ea typeface="Calibri"/>
-                <a:cs typeface="Calibri"/>
-                <a:sym typeface="Calibri"/>
-              </a:rPr>
-              <a:t>Переходим в код и рассматривает примеры с</a:t>
-            </a:r>
-            <a:r>
-              <a:rPr lang="en-US" sz="1200" b="0" i="0" u="none" strike="noStrike" cap="none" dirty="0">
-                <a:solidFill>
-                  <a:schemeClr val="dk1"/>
-                </a:solidFill>
-                <a:latin typeface="Calibri"/>
-                <a:ea typeface="Calibri"/>
-                <a:cs typeface="Calibri"/>
-                <a:sym typeface="Calibri"/>
-              </a:rPr>
-              <a:t> LINQ to SQL</a:t>
-            </a:r>
-            <a:endParaRPr sz="1200" b="0" i="0" u="none" strike="noStrike" cap="none" dirty="0">
+            <a:endParaRPr sz="1200" b="0" i="0" u="none" strike="noStrike" cap="none">
               <a:solidFill>
                 <a:schemeClr val="dk1"/>
               </a:solidFill>
@@ -2813,7 +3203,393 @@
     </p:spTree>
     <p:extLst>
       <p:ext uri="{BB962C8B-B14F-4D97-AF65-F5344CB8AC3E}">
-        <p14:creationId xmlns:p14="http://schemas.microsoft.com/office/powerpoint/2010/main" val="2807150285"/>
+        <p14:creationId xmlns:p14="http://schemas.microsoft.com/office/powerpoint/2010/main" val="4052242827"/>
+      </p:ext>
+    </p:extLst>
+  </p:cSld>
+  <p:clrMapOvr>
+    <a:masterClrMapping/>
+  </p:clrMapOvr>
+</p:notes>
+</file>
+
+<file path=ppt/notesSlides/notesSlide8.xml><?xml version="1.0" encoding="utf-8"?>
+<p:notes xmlns:a="http://schemas.openxmlformats.org/drawingml/2006/main" xmlns:r="http://schemas.openxmlformats.org/officeDocument/2006/relationships" xmlns:p="http://schemas.openxmlformats.org/presentationml/2006/main" showMasterSp="0" showMasterPhAnim="0">
+  <p:cSld>
+    <p:spTree>
+      <p:nvGrpSpPr>
+        <p:cNvPr id="1" name="Shape 152"/>
+        <p:cNvGrpSpPr/>
+        <p:nvPr/>
+      </p:nvGrpSpPr>
+      <p:grpSpPr>
+        <a:xfrm>
+          <a:off x="0" y="0"/>
+          <a:ext cx="0" cy="0"/>
+          <a:chOff x="0" y="0"/>
+          <a:chExt cx="0" cy="0"/>
+        </a:xfrm>
+      </p:grpSpPr>
+      <p:sp>
+        <p:nvSpPr>
+          <p:cNvPr id="153" name="Shape 153"/>
+          <p:cNvSpPr>
+            <a:spLocks noGrp="1" noRot="1" noChangeAspect="1"/>
+          </p:cNvSpPr>
+          <p:nvPr>
+            <p:ph type="sldImg" idx="2"/>
+          </p:nvPr>
+        </p:nvSpPr>
+        <p:spPr>
+          <a:xfrm>
+            <a:off x="1143000" y="685800"/>
+            <a:ext cx="4572000" cy="3429000"/>
+          </a:xfrm>
+          <a:custGeom>
+            <a:avLst/>
+            <a:gdLst/>
+            <a:ahLst/>
+            <a:cxnLst/>
+            <a:rect l="0" t="0" r="0" b="0"/>
+            <a:pathLst>
+              <a:path w="120000" h="120000" extrusionOk="0">
+                <a:moveTo>
+                  <a:pt x="0" y="0"/>
+                </a:moveTo>
+                <a:lnTo>
+                  <a:pt x="120000" y="0"/>
+                </a:lnTo>
+                <a:lnTo>
+                  <a:pt x="120000" y="120000"/>
+                </a:lnTo>
+                <a:lnTo>
+                  <a:pt x="0" y="120000"/>
+                </a:lnTo>
+                <a:close/>
+              </a:path>
+            </a:pathLst>
+          </a:custGeom>
+          <a:noFill/>
+          <a:ln w="9525" cap="flat" cmpd="sng">
+            <a:solidFill>
+              <a:srgbClr val="000000"/>
+            </a:solidFill>
+            <a:prstDash val="solid"/>
+            <a:miter lim="800000"/>
+            <a:headEnd type="none" w="med" len="med"/>
+            <a:tailEnd type="none" w="med" len="med"/>
+          </a:ln>
+        </p:spPr>
+      </p:sp>
+      <p:sp>
+        <p:nvSpPr>
+          <p:cNvPr id="154" name="Shape 154"/>
+          <p:cNvSpPr txBox="1">
+            <a:spLocks noGrp="1"/>
+          </p:cNvSpPr>
+          <p:nvPr>
+            <p:ph type="body" idx="1"/>
+          </p:nvPr>
+        </p:nvSpPr>
+        <p:spPr>
+          <a:xfrm>
+            <a:off x="685800" y="4343400"/>
+            <a:ext cx="5486400" cy="4114800"/>
+          </a:xfrm>
+          <a:prstGeom prst="rect">
+            <a:avLst/>
+          </a:prstGeom>
+          <a:noFill/>
+          <a:ln>
+            <a:noFill/>
+          </a:ln>
+        </p:spPr>
+        <p:txBody>
+          <a:bodyPr spcFirstLastPara="1" wrap="square" lIns="91425" tIns="45700" rIns="91425" bIns="45700" anchor="t" anchorCtr="0">
+            <a:noAutofit/>
+          </a:bodyPr>
+          <a:lstStyle/>
+          <a:p>
+            <a:pPr marL="0" marR="0" lvl="0" indent="0" algn="l" rtl="0">
+              <a:spcBef>
+                <a:spcPts val="0"/>
+              </a:spcBef>
+              <a:spcAft>
+                <a:spcPts val="0"/>
+              </a:spcAft>
+              <a:buNone/>
+            </a:pPr>
+            <a:endParaRPr sz="1200" b="0" i="0" u="none" strike="noStrike" cap="none">
+              <a:solidFill>
+                <a:schemeClr val="dk1"/>
+              </a:solidFill>
+              <a:latin typeface="Calibri"/>
+              <a:ea typeface="Calibri"/>
+              <a:cs typeface="Calibri"/>
+              <a:sym typeface="Calibri"/>
+            </a:endParaRPr>
+          </a:p>
+        </p:txBody>
+      </p:sp>
+      <p:sp>
+        <p:nvSpPr>
+          <p:cNvPr id="155" name="Shape 155"/>
+          <p:cNvSpPr txBox="1">
+            <a:spLocks noGrp="1"/>
+          </p:cNvSpPr>
+          <p:nvPr>
+            <p:ph type="sldNum" idx="12"/>
+          </p:nvPr>
+        </p:nvSpPr>
+        <p:spPr>
+          <a:xfrm>
+            <a:off x="3884613" y="8685213"/>
+            <a:ext cx="2971800" cy="457200"/>
+          </a:xfrm>
+          <a:prstGeom prst="rect">
+            <a:avLst/>
+          </a:prstGeom>
+          <a:noFill/>
+          <a:ln>
+            <a:noFill/>
+          </a:ln>
+        </p:spPr>
+        <p:txBody>
+          <a:bodyPr spcFirstLastPara="1" wrap="square" lIns="91425" tIns="45700" rIns="91425" bIns="45700" anchor="b" anchorCtr="0">
+            <a:noAutofit/>
+          </a:bodyPr>
+          <a:lstStyle/>
+          <a:p>
+            <a:pPr marL="0" marR="0" lvl="0" indent="0" algn="r" rtl="0">
+              <a:spcBef>
+                <a:spcPts val="0"/>
+              </a:spcBef>
+              <a:spcAft>
+                <a:spcPts val="0"/>
+              </a:spcAft>
+              <a:buNone/>
+            </a:pPr>
+            <a:fld id="{00000000-1234-1234-1234-123412341234}" type="slidenum">
+              <a:rPr lang="en-US" sz="1200" b="0" i="0" u="none" strike="noStrike" cap="none">
+                <a:solidFill>
+                  <a:schemeClr val="dk1"/>
+                </a:solidFill>
+                <a:latin typeface="Calibri"/>
+                <a:ea typeface="Calibri"/>
+                <a:cs typeface="Calibri"/>
+                <a:sym typeface="Calibri"/>
+              </a:rPr>
+              <a:t>8</a:t>
+            </a:fld>
+            <a:endParaRPr sz="1200" b="0" i="0" u="none" strike="noStrike" cap="none">
+              <a:solidFill>
+                <a:schemeClr val="dk1"/>
+              </a:solidFill>
+              <a:latin typeface="Calibri"/>
+              <a:ea typeface="Calibri"/>
+              <a:cs typeface="Calibri"/>
+              <a:sym typeface="Calibri"/>
+            </a:endParaRPr>
+          </a:p>
+        </p:txBody>
+      </p:sp>
+    </p:spTree>
+    <p:extLst>
+      <p:ext uri="{BB962C8B-B14F-4D97-AF65-F5344CB8AC3E}">
+        <p14:creationId xmlns:p14="http://schemas.microsoft.com/office/powerpoint/2010/main" val="2619872614"/>
+      </p:ext>
+    </p:extLst>
+  </p:cSld>
+  <p:clrMapOvr>
+    <a:masterClrMapping/>
+  </p:clrMapOvr>
+</p:notes>
+</file>
+
+<file path=ppt/notesSlides/notesSlide9.xml><?xml version="1.0" encoding="utf-8"?>
+<p:notes xmlns:a="http://schemas.openxmlformats.org/drawingml/2006/main" xmlns:r="http://schemas.openxmlformats.org/officeDocument/2006/relationships" xmlns:p="http://schemas.openxmlformats.org/presentationml/2006/main" showMasterSp="0" showMasterPhAnim="0">
+  <p:cSld>
+    <p:spTree>
+      <p:nvGrpSpPr>
+        <p:cNvPr id="1" name="Shape 152"/>
+        <p:cNvGrpSpPr/>
+        <p:nvPr/>
+      </p:nvGrpSpPr>
+      <p:grpSpPr>
+        <a:xfrm>
+          <a:off x="0" y="0"/>
+          <a:ext cx="0" cy="0"/>
+          <a:chOff x="0" y="0"/>
+          <a:chExt cx="0" cy="0"/>
+        </a:xfrm>
+      </p:grpSpPr>
+      <p:sp>
+        <p:nvSpPr>
+          <p:cNvPr id="153" name="Shape 153"/>
+          <p:cNvSpPr>
+            <a:spLocks noGrp="1" noRot="1" noChangeAspect="1"/>
+          </p:cNvSpPr>
+          <p:nvPr>
+            <p:ph type="sldImg" idx="2"/>
+          </p:nvPr>
+        </p:nvSpPr>
+        <p:spPr>
+          <a:xfrm>
+            <a:off x="1143000" y="685800"/>
+            <a:ext cx="4572000" cy="3429000"/>
+          </a:xfrm>
+          <a:custGeom>
+            <a:avLst/>
+            <a:gdLst/>
+            <a:ahLst/>
+            <a:cxnLst/>
+            <a:rect l="0" t="0" r="0" b="0"/>
+            <a:pathLst>
+              <a:path w="120000" h="120000" extrusionOk="0">
+                <a:moveTo>
+                  <a:pt x="0" y="0"/>
+                </a:moveTo>
+                <a:lnTo>
+                  <a:pt x="120000" y="0"/>
+                </a:lnTo>
+                <a:lnTo>
+                  <a:pt x="120000" y="120000"/>
+                </a:lnTo>
+                <a:lnTo>
+                  <a:pt x="0" y="120000"/>
+                </a:lnTo>
+                <a:close/>
+              </a:path>
+            </a:pathLst>
+          </a:custGeom>
+          <a:noFill/>
+          <a:ln w="9525" cap="flat" cmpd="sng">
+            <a:solidFill>
+              <a:srgbClr val="000000"/>
+            </a:solidFill>
+            <a:prstDash val="solid"/>
+            <a:miter lim="800000"/>
+            <a:headEnd type="none" w="med" len="med"/>
+            <a:tailEnd type="none" w="med" len="med"/>
+          </a:ln>
+        </p:spPr>
+      </p:sp>
+      <p:sp>
+        <p:nvSpPr>
+          <p:cNvPr id="154" name="Shape 154"/>
+          <p:cNvSpPr txBox="1">
+            <a:spLocks noGrp="1"/>
+          </p:cNvSpPr>
+          <p:nvPr>
+            <p:ph type="body" idx="1"/>
+          </p:nvPr>
+        </p:nvSpPr>
+        <p:spPr>
+          <a:xfrm>
+            <a:off x="685800" y="4343400"/>
+            <a:ext cx="5486400" cy="4114800"/>
+          </a:xfrm>
+          <a:prstGeom prst="rect">
+            <a:avLst/>
+          </a:prstGeom>
+          <a:noFill/>
+          <a:ln>
+            <a:noFill/>
+          </a:ln>
+        </p:spPr>
+        <p:txBody>
+          <a:bodyPr spcFirstLastPara="1" wrap="square" lIns="91425" tIns="45700" rIns="91425" bIns="45700" anchor="t" anchorCtr="0">
+            <a:noAutofit/>
+          </a:bodyPr>
+          <a:lstStyle/>
+          <a:p>
+            <a:pPr marL="0" marR="0" lvl="0" indent="0" algn="l" rtl="0">
+              <a:spcBef>
+                <a:spcPts val="0"/>
+              </a:spcBef>
+              <a:spcAft>
+                <a:spcPts val="0"/>
+              </a:spcAft>
+              <a:buNone/>
+            </a:pPr>
+            <a:endParaRPr sz="1200" b="0" i="0" u="none" strike="noStrike" cap="none" dirty="0">
+              <a:solidFill>
+                <a:schemeClr val="dk1"/>
+              </a:solidFill>
+              <a:latin typeface="Calibri"/>
+              <a:ea typeface="Calibri"/>
+              <a:cs typeface="Calibri"/>
+              <a:sym typeface="Calibri"/>
+            </a:endParaRPr>
+          </a:p>
+        </p:txBody>
+      </p:sp>
+      <p:sp>
+        <p:nvSpPr>
+          <p:cNvPr id="155" name="Shape 155"/>
+          <p:cNvSpPr txBox="1">
+            <a:spLocks noGrp="1"/>
+          </p:cNvSpPr>
+          <p:nvPr>
+            <p:ph type="sldNum" idx="12"/>
+          </p:nvPr>
+        </p:nvSpPr>
+        <p:spPr>
+          <a:xfrm>
+            <a:off x="3884613" y="8685213"/>
+            <a:ext cx="2971800" cy="457200"/>
+          </a:xfrm>
+          <a:prstGeom prst="rect">
+            <a:avLst/>
+          </a:prstGeom>
+          <a:noFill/>
+          <a:ln>
+            <a:noFill/>
+          </a:ln>
+        </p:spPr>
+        <p:txBody>
+          <a:bodyPr spcFirstLastPara="1" wrap="square" lIns="91425" tIns="45700" rIns="91425" bIns="45700" anchor="b" anchorCtr="0">
+            <a:noAutofit/>
+          </a:bodyPr>
+          <a:lstStyle/>
+          <a:p>
+            <a:pPr marL="0" marR="0" lvl="0" indent="0" algn="r" rtl="0">
+              <a:spcBef>
+                <a:spcPts val="0"/>
+              </a:spcBef>
+              <a:spcAft>
+                <a:spcPts val="0"/>
+              </a:spcAft>
+              <a:buNone/>
+            </a:pPr>
+            <a:fld id="{00000000-1234-1234-1234-123412341234}" type="slidenum">
+              <a:rPr lang="en-US" sz="1200" b="0" i="0" u="none" strike="noStrike" cap="none">
+                <a:solidFill>
+                  <a:schemeClr val="dk1"/>
+                </a:solidFill>
+                <a:latin typeface="Calibri"/>
+                <a:ea typeface="Calibri"/>
+                <a:cs typeface="Calibri"/>
+                <a:sym typeface="Calibri"/>
+              </a:rPr>
+              <a:t>9</a:t>
+            </a:fld>
+            <a:endParaRPr sz="1200" b="0" i="0" u="none" strike="noStrike" cap="none">
+              <a:solidFill>
+                <a:schemeClr val="dk1"/>
+              </a:solidFill>
+              <a:latin typeface="Calibri"/>
+              <a:ea typeface="Calibri"/>
+              <a:cs typeface="Calibri"/>
+              <a:sym typeface="Calibri"/>
+            </a:endParaRPr>
+          </a:p>
+        </p:txBody>
+      </p:sp>
+    </p:spTree>
+    <p:extLst>
+      <p:ext uri="{BB962C8B-B14F-4D97-AF65-F5344CB8AC3E}">
+        <p14:creationId xmlns:p14="http://schemas.microsoft.com/office/powerpoint/2010/main" val="2937116793"/>
       </p:ext>
     </p:extLst>
   </p:cSld>
@@ -17949,6 +18725,893 @@
 </p:sld>
 </file>
 
+<file path=ppt/slides/slide10.xml><?xml version="1.0" encoding="utf-8"?>
+<p:sld xmlns:a="http://schemas.openxmlformats.org/drawingml/2006/main" xmlns:r="http://schemas.openxmlformats.org/officeDocument/2006/relationships" xmlns:p="http://schemas.openxmlformats.org/presentationml/2006/main">
+  <p:cSld>
+    <p:spTree>
+      <p:nvGrpSpPr>
+        <p:cNvPr id="1" name="Shape 156"/>
+        <p:cNvGrpSpPr/>
+        <p:nvPr/>
+      </p:nvGrpSpPr>
+      <p:grpSpPr>
+        <a:xfrm>
+          <a:off x="0" y="0"/>
+          <a:ext cx="0" cy="0"/>
+          <a:chOff x="0" y="0"/>
+          <a:chExt cx="0" cy="0"/>
+        </a:xfrm>
+      </p:grpSpPr>
+      <p:sp>
+        <p:nvSpPr>
+          <p:cNvPr id="158" name="Shape 158"/>
+          <p:cNvSpPr txBox="1">
+            <a:spLocks noGrp="1"/>
+          </p:cNvSpPr>
+          <p:nvPr>
+            <p:ph type="title"/>
+          </p:nvPr>
+        </p:nvSpPr>
+        <p:spPr>
+          <a:xfrm>
+            <a:off x="446567" y="1647111"/>
+            <a:ext cx="8229600" cy="1143000"/>
+          </a:xfrm>
+          <a:prstGeom prst="rect">
+            <a:avLst/>
+          </a:prstGeom>
+          <a:noFill/>
+          <a:ln>
+            <a:noFill/>
+          </a:ln>
+        </p:spPr>
+        <p:txBody>
+          <a:bodyPr spcFirstLastPara="1" wrap="square" lIns="91425" tIns="45700" rIns="91425" bIns="45700" anchor="ctr" anchorCtr="0">
+            <a:noAutofit/>
+          </a:bodyPr>
+          <a:lstStyle/>
+          <a:p>
+            <a:pPr lvl="0" algn="l"/>
+            <a:r>
+              <a:rPr lang="ru-RU" sz="4100" b="1" dirty="0">
+                <a:latin typeface="Roboto"/>
+                <a:ea typeface="Roboto"/>
+                <a:sym typeface="Roboto"/>
+              </a:rPr>
+              <a:t>Способы подгрузки зависимых в </a:t>
+            </a:r>
+            <a:r>
+              <a:rPr lang="en-US" sz="4100" b="1" dirty="0">
+                <a:latin typeface="Roboto"/>
+                <a:ea typeface="Roboto"/>
+                <a:sym typeface="Roboto"/>
+              </a:rPr>
+              <a:t>EF Core</a:t>
+            </a:r>
+            <a:endParaRPr lang="ru-RU" sz="4100" b="1" i="0" u="none" strike="noStrike" cap="none" dirty="0">
+              <a:solidFill>
+                <a:srgbClr val="262626"/>
+              </a:solidFill>
+              <a:latin typeface="Roboto"/>
+              <a:ea typeface="Roboto"/>
+              <a:cs typeface="Roboto"/>
+              <a:sym typeface="Roboto"/>
+            </a:endParaRPr>
+          </a:p>
+        </p:txBody>
+      </p:sp>
+      <p:sp>
+        <p:nvSpPr>
+          <p:cNvPr id="159" name="Shape 159"/>
+          <p:cNvSpPr/>
+          <p:nvPr/>
+        </p:nvSpPr>
+        <p:spPr>
+          <a:xfrm>
+            <a:off x="7145316" y="408237"/>
+            <a:ext cx="1856100" cy="290400"/>
+          </a:xfrm>
+          <a:prstGeom prst="roundRect">
+            <a:avLst>
+              <a:gd name="adj" fmla="val 0"/>
+            </a:avLst>
+          </a:prstGeom>
+          <a:noFill/>
+          <a:ln>
+            <a:noFill/>
+          </a:ln>
+        </p:spPr>
+        <p:txBody>
+          <a:bodyPr spcFirstLastPara="1" wrap="square" lIns="91425" tIns="45700" rIns="91425" bIns="45700" anchor="ctr" anchorCtr="0">
+            <a:noAutofit/>
+          </a:bodyPr>
+          <a:lstStyle/>
+          <a:p>
+            <a:pPr marL="0" marR="0" lvl="0" indent="0" algn="ctr" rtl="0">
+              <a:spcBef>
+                <a:spcPts val="0"/>
+              </a:spcBef>
+              <a:spcAft>
+                <a:spcPts val="0"/>
+              </a:spcAft>
+              <a:buClr>
+                <a:schemeClr val="lt1"/>
+              </a:buClr>
+              <a:buSzPts val="1200"/>
+              <a:buFont typeface="Arial"/>
+              <a:buNone/>
+            </a:pPr>
+            <a:r>
+              <a:rPr lang="en-US" sz="1500" b="1" i="0" strike="noStrike" cap="none">
+                <a:solidFill>
+                  <a:srgbClr val="262626"/>
+                </a:solidFill>
+                <a:latin typeface="Roboto"/>
+                <a:ea typeface="Roboto"/>
+                <a:cs typeface="Roboto"/>
+                <a:sym typeface="Roboto"/>
+              </a:rPr>
+              <a:t>www.itea.ua</a:t>
+            </a:r>
+            <a:endParaRPr sz="1500" b="1" i="0" strike="noStrike" cap="none">
+              <a:solidFill>
+                <a:srgbClr val="262626"/>
+              </a:solidFill>
+              <a:latin typeface="Roboto"/>
+              <a:ea typeface="Roboto"/>
+              <a:cs typeface="Roboto"/>
+              <a:sym typeface="Roboto"/>
+            </a:endParaRPr>
+          </a:p>
+        </p:txBody>
+      </p:sp>
+      <p:sp>
+        <p:nvSpPr>
+          <p:cNvPr id="160" name="Shape 160"/>
+          <p:cNvSpPr/>
+          <p:nvPr/>
+        </p:nvSpPr>
+        <p:spPr>
+          <a:xfrm rot="10800000" flipH="1">
+            <a:off x="0" y="1127850"/>
+            <a:ext cx="3143100" cy="42300"/>
+          </a:xfrm>
+          <a:prstGeom prst="rect">
+            <a:avLst/>
+          </a:prstGeom>
+          <a:solidFill>
+            <a:srgbClr val="CC0000"/>
+          </a:solidFill>
+          <a:ln>
+            <a:noFill/>
+          </a:ln>
+        </p:spPr>
+        <p:txBody>
+          <a:bodyPr spcFirstLastPara="1" wrap="square" lIns="91425" tIns="91425" rIns="91425" bIns="91425" anchor="ctr" anchorCtr="0">
+            <a:noAutofit/>
+          </a:bodyPr>
+          <a:lstStyle/>
+          <a:p>
+            <a:pPr marL="0" lvl="0" indent="0">
+              <a:spcBef>
+                <a:spcPts val="0"/>
+              </a:spcBef>
+              <a:spcAft>
+                <a:spcPts val="0"/>
+              </a:spcAft>
+              <a:buNone/>
+            </a:pPr>
+            <a:r>
+              <a:rPr lang="en-US"/>
+              <a:t>                                                                                     </a:t>
+            </a:r>
+            <a:endParaRPr/>
+          </a:p>
+        </p:txBody>
+      </p:sp>
+      <p:sp>
+        <p:nvSpPr>
+          <p:cNvPr id="161" name="Shape 161"/>
+          <p:cNvSpPr/>
+          <p:nvPr/>
+        </p:nvSpPr>
+        <p:spPr>
+          <a:xfrm rot="10800000" flipH="1">
+            <a:off x="3067050" y="1127850"/>
+            <a:ext cx="3143100" cy="42300"/>
+          </a:xfrm>
+          <a:prstGeom prst="rect">
+            <a:avLst/>
+          </a:prstGeom>
+          <a:solidFill>
+            <a:srgbClr val="262626"/>
+          </a:solidFill>
+          <a:ln>
+            <a:noFill/>
+          </a:ln>
+        </p:spPr>
+        <p:txBody>
+          <a:bodyPr spcFirstLastPara="1" wrap="square" lIns="91425" tIns="91425" rIns="91425" bIns="91425" anchor="ctr" anchorCtr="0">
+            <a:noAutofit/>
+          </a:bodyPr>
+          <a:lstStyle/>
+          <a:p>
+            <a:pPr marL="0" lvl="0" indent="0">
+              <a:spcBef>
+                <a:spcPts val="0"/>
+              </a:spcBef>
+              <a:spcAft>
+                <a:spcPts val="0"/>
+              </a:spcAft>
+              <a:buNone/>
+            </a:pPr>
+            <a:endParaRPr/>
+          </a:p>
+        </p:txBody>
+      </p:sp>
+      <p:pic>
+        <p:nvPicPr>
+          <p:cNvPr id="162" name="Shape 162"/>
+          <p:cNvPicPr preferRelativeResize="0"/>
+          <p:nvPr/>
+        </p:nvPicPr>
+        <p:blipFill>
+          <a:blip r:embed="rId3">
+            <a:alphaModFix/>
+          </a:blip>
+          <a:stretch>
+            <a:fillRect/>
+          </a:stretch>
+        </p:blipFill>
+        <p:spPr>
+          <a:xfrm>
+            <a:off x="353700" y="302000"/>
+            <a:ext cx="1741800" cy="502875"/>
+          </a:xfrm>
+          <a:prstGeom prst="rect">
+            <a:avLst/>
+          </a:prstGeom>
+          <a:noFill/>
+          <a:ln>
+            <a:noFill/>
+          </a:ln>
+        </p:spPr>
+      </p:pic>
+      <p:sp>
+        <p:nvSpPr>
+          <p:cNvPr id="163" name="Shape 163"/>
+          <p:cNvSpPr txBox="1"/>
+          <p:nvPr/>
+        </p:nvSpPr>
+        <p:spPr>
+          <a:xfrm>
+            <a:off x="467326" y="2825549"/>
+            <a:ext cx="8181300" cy="3074100"/>
+          </a:xfrm>
+          <a:prstGeom prst="rect">
+            <a:avLst/>
+          </a:prstGeom>
+          <a:noFill/>
+          <a:ln>
+            <a:noFill/>
+          </a:ln>
+        </p:spPr>
+        <p:txBody>
+          <a:bodyPr spcFirstLastPara="1" wrap="square" lIns="91425" tIns="45700" rIns="91425" bIns="45700" anchor="ctr" anchorCtr="0">
+            <a:noAutofit/>
+          </a:bodyPr>
+          <a:lstStyle/>
+          <a:p>
+            <a:pPr lvl="0">
+              <a:buSzPts val="2000"/>
+            </a:pPr>
+            <a:endParaRPr lang="en-US" sz="2400" dirty="0">
+              <a:latin typeface="Roboto"/>
+              <a:ea typeface="Roboto"/>
+            </a:endParaRPr>
+          </a:p>
+          <a:p>
+            <a:pPr indent="-12700">
+              <a:buSzPts val="2000"/>
+              <a:buFont typeface="Noto Sans Symbols"/>
+              <a:buChar char="▪"/>
+            </a:pPr>
+            <a:r>
+              <a:rPr lang="en-US" sz="2400" dirty="0">
+                <a:latin typeface="Roboto"/>
+                <a:ea typeface="Roboto"/>
+                <a:sym typeface="Roboto"/>
+              </a:rPr>
+              <a:t> </a:t>
+            </a:r>
+            <a:r>
+              <a:rPr lang="en-US" sz="2400" b="1" dirty="0">
+                <a:latin typeface="Roboto"/>
+                <a:ea typeface="Roboto"/>
+              </a:rPr>
+              <a:t>Eager loading </a:t>
+            </a:r>
+            <a:r>
+              <a:rPr lang="en-US" sz="2400" dirty="0">
+                <a:latin typeface="Roboto"/>
+                <a:ea typeface="Roboto"/>
+              </a:rPr>
+              <a:t>- </a:t>
+            </a:r>
+            <a:r>
+              <a:rPr lang="ru-RU" sz="2400" dirty="0">
+                <a:latin typeface="Roboto"/>
+                <a:ea typeface="Roboto"/>
+              </a:rPr>
+              <a:t>это тип загрузки, при котором зависимые данные подгружаются вместе с загрузкой основных данных.</a:t>
+            </a:r>
+            <a:endParaRPr lang="en-US" sz="2400" dirty="0">
+              <a:latin typeface="Roboto"/>
+              <a:ea typeface="Roboto"/>
+              <a:sym typeface="Calibri"/>
+            </a:endParaRPr>
+          </a:p>
+          <a:p>
+            <a:pPr indent="-12700">
+              <a:buSzPts val="2000"/>
+              <a:buFont typeface="Noto Sans Symbols"/>
+              <a:buChar char="▪"/>
+            </a:pPr>
+            <a:endParaRPr lang="en-US" sz="2400" dirty="0">
+              <a:latin typeface="Roboto"/>
+              <a:ea typeface="Roboto"/>
+              <a:sym typeface="Calibri"/>
+            </a:endParaRPr>
+          </a:p>
+          <a:p>
+            <a:pPr indent="-12700">
+              <a:buSzPts val="2000"/>
+              <a:buFont typeface="Noto Sans Symbols"/>
+              <a:buChar char="▪"/>
+            </a:pPr>
+            <a:r>
+              <a:rPr lang="en-US" sz="2400" dirty="0">
+                <a:latin typeface="Roboto"/>
+                <a:ea typeface="Roboto"/>
+              </a:rPr>
+              <a:t> </a:t>
+            </a:r>
+            <a:r>
+              <a:rPr lang="en-US" sz="2400" b="1" dirty="0">
+                <a:latin typeface="Roboto"/>
+                <a:ea typeface="Roboto"/>
+              </a:rPr>
+              <a:t>Lazy loading</a:t>
+            </a:r>
+            <a:r>
+              <a:rPr lang="ru-RU" sz="2400" dirty="0">
+                <a:latin typeface="Roboto"/>
+                <a:ea typeface="Roboto"/>
+              </a:rPr>
+              <a:t> – это тип загрузки, при котором зависимые данные подгружаются в тот момент когда они необходимы.</a:t>
+            </a:r>
+            <a:r>
+              <a:rPr lang="en-US" sz="2400" dirty="0">
+                <a:latin typeface="Roboto"/>
+                <a:ea typeface="Roboto"/>
+              </a:rPr>
+              <a:t> </a:t>
+            </a:r>
+            <a:endParaRPr lang="ru-RU" sz="2400" dirty="0">
+              <a:latin typeface="Roboto"/>
+              <a:ea typeface="Roboto"/>
+              <a:sym typeface="Calibri"/>
+            </a:endParaRPr>
+          </a:p>
+          <a:p>
+            <a:pPr lvl="0" indent="-12700">
+              <a:buSzPts val="2000"/>
+              <a:buFont typeface="Noto Sans Symbols"/>
+              <a:buChar char="▪"/>
+            </a:pPr>
+            <a:endParaRPr sz="2400" dirty="0">
+              <a:latin typeface="Roboto"/>
+              <a:ea typeface="Roboto"/>
+              <a:sym typeface="Roboto"/>
+            </a:endParaRPr>
+          </a:p>
+        </p:txBody>
+      </p:sp>
+    </p:spTree>
+    <p:extLst>
+      <p:ext uri="{BB962C8B-B14F-4D97-AF65-F5344CB8AC3E}">
+        <p14:creationId xmlns:p14="http://schemas.microsoft.com/office/powerpoint/2010/main" val="2724295815"/>
+      </p:ext>
+    </p:extLst>
+  </p:cSld>
+  <p:clrMapOvr>
+    <a:masterClrMapping/>
+  </p:clrMapOvr>
+  <p:transition>
+    <p:fade/>
+  </p:transition>
+</p:sld>
+</file>
+
+<file path=ppt/slides/slide11.xml><?xml version="1.0" encoding="utf-8"?>
+<p:sld xmlns:a="http://schemas.openxmlformats.org/drawingml/2006/main" xmlns:r="http://schemas.openxmlformats.org/officeDocument/2006/relationships" xmlns:p="http://schemas.openxmlformats.org/presentationml/2006/main">
+  <p:cSld>
+    <p:spTree>
+      <p:nvGrpSpPr>
+        <p:cNvPr id="1" name="Shape 156"/>
+        <p:cNvGrpSpPr/>
+        <p:nvPr/>
+      </p:nvGrpSpPr>
+      <p:grpSpPr>
+        <a:xfrm>
+          <a:off x="0" y="0"/>
+          <a:ext cx="0" cy="0"/>
+          <a:chOff x="0" y="0"/>
+          <a:chExt cx="0" cy="0"/>
+        </a:xfrm>
+      </p:grpSpPr>
+      <p:sp>
+        <p:nvSpPr>
+          <p:cNvPr id="158" name="Shape 158"/>
+          <p:cNvSpPr txBox="1">
+            <a:spLocks noGrp="1"/>
+          </p:cNvSpPr>
+          <p:nvPr>
+            <p:ph type="title"/>
+          </p:nvPr>
+        </p:nvSpPr>
+        <p:spPr>
+          <a:xfrm>
+            <a:off x="443176" y="1370975"/>
+            <a:ext cx="8229600" cy="1143000"/>
+          </a:xfrm>
+          <a:prstGeom prst="rect">
+            <a:avLst/>
+          </a:prstGeom>
+          <a:noFill/>
+          <a:ln>
+            <a:noFill/>
+          </a:ln>
+        </p:spPr>
+        <p:txBody>
+          <a:bodyPr spcFirstLastPara="1" wrap="square" lIns="91425" tIns="45700" rIns="91425" bIns="45700" anchor="ctr" anchorCtr="0">
+            <a:noAutofit/>
+          </a:bodyPr>
+          <a:lstStyle/>
+          <a:p>
+            <a:pPr marL="0" marR="0" lvl="0" indent="0" algn="l" rtl="0">
+              <a:spcBef>
+                <a:spcPts val="0"/>
+              </a:spcBef>
+              <a:spcAft>
+                <a:spcPts val="0"/>
+              </a:spcAft>
+              <a:buClr>
+                <a:schemeClr val="dk1"/>
+              </a:buClr>
+              <a:buSzPts val="4400"/>
+              <a:buFont typeface="Calibri"/>
+              <a:buNone/>
+            </a:pPr>
+            <a:r>
+              <a:rPr lang="ru-RU" sz="4100" b="1" dirty="0">
+                <a:solidFill>
+                  <a:srgbClr val="262626"/>
+                </a:solidFill>
+                <a:latin typeface="Roboto"/>
+                <a:ea typeface="Roboto"/>
+                <a:cs typeface="Roboto"/>
+                <a:sym typeface="Roboto"/>
+              </a:rPr>
+              <a:t> </a:t>
+            </a:r>
+            <a:r>
+              <a:rPr lang="en-US" sz="4100" b="1" dirty="0">
+                <a:solidFill>
+                  <a:srgbClr val="262626"/>
+                </a:solidFill>
+                <a:latin typeface="Roboto"/>
+                <a:ea typeface="Roboto"/>
+                <a:cs typeface="Roboto"/>
+                <a:sym typeface="Roboto"/>
+              </a:rPr>
+              <a:t>LINQ to SQL</a:t>
+            </a:r>
+            <a:endParaRPr sz="4100" b="1" i="0" u="none" strike="noStrike" cap="none" dirty="0">
+              <a:solidFill>
+                <a:srgbClr val="262626"/>
+              </a:solidFill>
+              <a:latin typeface="Roboto"/>
+              <a:ea typeface="Roboto"/>
+              <a:cs typeface="Roboto"/>
+              <a:sym typeface="Roboto"/>
+            </a:endParaRPr>
+          </a:p>
+        </p:txBody>
+      </p:sp>
+      <p:sp>
+        <p:nvSpPr>
+          <p:cNvPr id="159" name="Shape 159"/>
+          <p:cNvSpPr/>
+          <p:nvPr/>
+        </p:nvSpPr>
+        <p:spPr>
+          <a:xfrm>
+            <a:off x="7145316" y="408237"/>
+            <a:ext cx="1856100" cy="290400"/>
+          </a:xfrm>
+          <a:prstGeom prst="roundRect">
+            <a:avLst>
+              <a:gd name="adj" fmla="val 0"/>
+            </a:avLst>
+          </a:prstGeom>
+          <a:noFill/>
+          <a:ln>
+            <a:noFill/>
+          </a:ln>
+        </p:spPr>
+        <p:txBody>
+          <a:bodyPr spcFirstLastPara="1" wrap="square" lIns="91425" tIns="45700" rIns="91425" bIns="45700" anchor="ctr" anchorCtr="0">
+            <a:noAutofit/>
+          </a:bodyPr>
+          <a:lstStyle/>
+          <a:p>
+            <a:pPr marL="0" marR="0" lvl="0" indent="0" algn="ctr" rtl="0">
+              <a:spcBef>
+                <a:spcPts val="0"/>
+              </a:spcBef>
+              <a:spcAft>
+                <a:spcPts val="0"/>
+              </a:spcAft>
+              <a:buClr>
+                <a:schemeClr val="lt1"/>
+              </a:buClr>
+              <a:buSzPts val="1200"/>
+              <a:buFont typeface="Arial"/>
+              <a:buNone/>
+            </a:pPr>
+            <a:r>
+              <a:rPr lang="en-US" sz="1500" b="1" i="0" strike="noStrike" cap="none">
+                <a:solidFill>
+                  <a:srgbClr val="262626"/>
+                </a:solidFill>
+                <a:latin typeface="Roboto"/>
+                <a:ea typeface="Roboto"/>
+                <a:cs typeface="Roboto"/>
+                <a:sym typeface="Roboto"/>
+              </a:rPr>
+              <a:t>www.itea.ua</a:t>
+            </a:r>
+            <a:endParaRPr sz="1500" b="1" i="0" strike="noStrike" cap="none">
+              <a:solidFill>
+                <a:srgbClr val="262626"/>
+              </a:solidFill>
+              <a:latin typeface="Roboto"/>
+              <a:ea typeface="Roboto"/>
+              <a:cs typeface="Roboto"/>
+              <a:sym typeface="Roboto"/>
+            </a:endParaRPr>
+          </a:p>
+        </p:txBody>
+      </p:sp>
+      <p:sp>
+        <p:nvSpPr>
+          <p:cNvPr id="160" name="Shape 160"/>
+          <p:cNvSpPr/>
+          <p:nvPr/>
+        </p:nvSpPr>
+        <p:spPr>
+          <a:xfrm rot="10800000" flipH="1">
+            <a:off x="0" y="1127850"/>
+            <a:ext cx="3143100" cy="42300"/>
+          </a:xfrm>
+          <a:prstGeom prst="rect">
+            <a:avLst/>
+          </a:prstGeom>
+          <a:solidFill>
+            <a:srgbClr val="CC0000"/>
+          </a:solidFill>
+          <a:ln>
+            <a:noFill/>
+          </a:ln>
+        </p:spPr>
+        <p:txBody>
+          <a:bodyPr spcFirstLastPara="1" wrap="square" lIns="91425" tIns="91425" rIns="91425" bIns="91425" anchor="ctr" anchorCtr="0">
+            <a:noAutofit/>
+          </a:bodyPr>
+          <a:lstStyle/>
+          <a:p>
+            <a:pPr marL="0" lvl="0" indent="0">
+              <a:spcBef>
+                <a:spcPts val="0"/>
+              </a:spcBef>
+              <a:spcAft>
+                <a:spcPts val="0"/>
+              </a:spcAft>
+              <a:buNone/>
+            </a:pPr>
+            <a:r>
+              <a:rPr lang="en-US"/>
+              <a:t>                                                                                     </a:t>
+            </a:r>
+            <a:endParaRPr/>
+          </a:p>
+        </p:txBody>
+      </p:sp>
+      <p:sp>
+        <p:nvSpPr>
+          <p:cNvPr id="161" name="Shape 161"/>
+          <p:cNvSpPr/>
+          <p:nvPr/>
+        </p:nvSpPr>
+        <p:spPr>
+          <a:xfrm rot="10800000" flipH="1">
+            <a:off x="3067050" y="1127850"/>
+            <a:ext cx="3143100" cy="42300"/>
+          </a:xfrm>
+          <a:prstGeom prst="rect">
+            <a:avLst/>
+          </a:prstGeom>
+          <a:solidFill>
+            <a:srgbClr val="262626"/>
+          </a:solidFill>
+          <a:ln>
+            <a:noFill/>
+          </a:ln>
+        </p:spPr>
+        <p:txBody>
+          <a:bodyPr spcFirstLastPara="1" wrap="square" lIns="91425" tIns="91425" rIns="91425" bIns="91425" anchor="ctr" anchorCtr="0">
+            <a:noAutofit/>
+          </a:bodyPr>
+          <a:lstStyle/>
+          <a:p>
+            <a:pPr marL="0" lvl="0" indent="0">
+              <a:spcBef>
+                <a:spcPts val="0"/>
+              </a:spcBef>
+              <a:spcAft>
+                <a:spcPts val="0"/>
+              </a:spcAft>
+              <a:buNone/>
+            </a:pPr>
+            <a:endParaRPr/>
+          </a:p>
+        </p:txBody>
+      </p:sp>
+      <p:pic>
+        <p:nvPicPr>
+          <p:cNvPr id="162" name="Shape 162"/>
+          <p:cNvPicPr preferRelativeResize="0"/>
+          <p:nvPr/>
+        </p:nvPicPr>
+        <p:blipFill>
+          <a:blip r:embed="rId3">
+            <a:alphaModFix/>
+          </a:blip>
+          <a:stretch>
+            <a:fillRect/>
+          </a:stretch>
+        </p:blipFill>
+        <p:spPr>
+          <a:xfrm>
+            <a:off x="353700" y="302000"/>
+            <a:ext cx="1741800" cy="502875"/>
+          </a:xfrm>
+          <a:prstGeom prst="rect">
+            <a:avLst/>
+          </a:prstGeom>
+          <a:noFill/>
+          <a:ln>
+            <a:noFill/>
+          </a:ln>
+        </p:spPr>
+      </p:pic>
+      <p:sp>
+        <p:nvSpPr>
+          <p:cNvPr id="163" name="Shape 163"/>
+          <p:cNvSpPr txBox="1"/>
+          <p:nvPr/>
+        </p:nvSpPr>
+        <p:spPr>
+          <a:xfrm>
+            <a:off x="443176" y="2513975"/>
+            <a:ext cx="8181300" cy="3853874"/>
+          </a:xfrm>
+          <a:prstGeom prst="rect">
+            <a:avLst/>
+          </a:prstGeom>
+          <a:noFill/>
+          <a:ln>
+            <a:noFill/>
+          </a:ln>
+        </p:spPr>
+        <p:txBody>
+          <a:bodyPr spcFirstLastPara="1" wrap="square" lIns="91425" tIns="45700" rIns="91425" bIns="45700" anchor="ctr" anchorCtr="0">
+            <a:noAutofit/>
+          </a:bodyPr>
+          <a:lstStyle/>
+          <a:p>
+            <a:pPr lvl="0" indent="-12700">
+              <a:spcAft>
+                <a:spcPts val="1200"/>
+              </a:spcAft>
+              <a:buSzPts val="2000"/>
+              <a:buFont typeface="Noto Sans Symbols"/>
+              <a:buChar char="▪"/>
+            </a:pPr>
+            <a:r>
+              <a:rPr lang="ru-RU" sz="2000" b="1" dirty="0">
+                <a:solidFill>
+                  <a:srgbClr val="262626"/>
+                </a:solidFill>
+                <a:latin typeface="Roboto"/>
+                <a:ea typeface="Roboto"/>
+                <a:cs typeface="Roboto"/>
+                <a:sym typeface="Roboto"/>
+              </a:rPr>
+              <a:t> </a:t>
+            </a:r>
+            <a:r>
+              <a:rPr lang="en-US" sz="2000" b="1" dirty="0">
+                <a:solidFill>
+                  <a:srgbClr val="262626"/>
+                </a:solidFill>
+                <a:latin typeface="Roboto"/>
+                <a:ea typeface="Roboto"/>
+                <a:cs typeface="Roboto"/>
+                <a:sym typeface="Roboto"/>
+              </a:rPr>
+              <a:t>LINQ to SQL </a:t>
+            </a:r>
+            <a:r>
+              <a:rPr lang="ru-RU" sz="2000" dirty="0">
+                <a:solidFill>
+                  <a:srgbClr val="262626"/>
+                </a:solidFill>
+                <a:latin typeface="Roboto"/>
+                <a:ea typeface="Roboto"/>
+                <a:cs typeface="Roboto"/>
+                <a:sym typeface="Roboto"/>
+              </a:rPr>
+              <a:t>– это компонент </a:t>
+            </a:r>
+            <a:r>
+              <a:rPr lang="en-US" sz="2000" dirty="0">
+                <a:solidFill>
+                  <a:srgbClr val="262626"/>
+                </a:solidFill>
+                <a:latin typeface="Roboto"/>
+                <a:ea typeface="Roboto"/>
+                <a:cs typeface="Roboto"/>
+                <a:sym typeface="Roboto"/>
+              </a:rPr>
+              <a:t>.NET Framework</a:t>
+            </a:r>
+            <a:r>
+              <a:rPr lang="ru-RU" sz="2000" dirty="0">
+                <a:solidFill>
+                  <a:srgbClr val="262626"/>
+                </a:solidFill>
+                <a:latin typeface="Roboto"/>
+                <a:ea typeface="Roboto"/>
+                <a:cs typeface="Roboto"/>
+                <a:sym typeface="Roboto"/>
+              </a:rPr>
+              <a:t>, который позволяет работать с реляционными структурами как с обьектами. </a:t>
+            </a:r>
+          </a:p>
+          <a:p>
+            <a:pPr lvl="0" indent="-12700">
+              <a:spcAft>
+                <a:spcPts val="1200"/>
+              </a:spcAft>
+              <a:buSzPts val="2000"/>
+              <a:buFont typeface="Noto Sans Symbols"/>
+              <a:buChar char="▪"/>
+            </a:pPr>
+            <a:r>
+              <a:rPr lang="ru-RU" sz="2000" dirty="0">
+                <a:solidFill>
+                  <a:srgbClr val="262626"/>
+                </a:solidFill>
+                <a:latin typeface="Roboto"/>
+                <a:ea typeface="Roboto"/>
+                <a:cs typeface="Roboto"/>
+                <a:sym typeface="Roboto"/>
+              </a:rPr>
+              <a:t> Простыми словами: вы выполняете запрос используя</a:t>
+            </a:r>
+            <a:r>
+              <a:rPr lang="en-US" sz="2000" dirty="0">
+                <a:solidFill>
+                  <a:srgbClr val="262626"/>
+                </a:solidFill>
+                <a:latin typeface="Roboto"/>
+                <a:ea typeface="Roboto"/>
+                <a:cs typeface="Roboto"/>
+                <a:sym typeface="Roboto"/>
+              </a:rPr>
+              <a:t> LINQ</a:t>
+            </a:r>
+            <a:r>
+              <a:rPr lang="ru-RU" sz="2000" dirty="0">
+                <a:solidFill>
+                  <a:srgbClr val="262626"/>
+                </a:solidFill>
+                <a:latin typeface="Roboto"/>
+                <a:ea typeface="Roboto"/>
+                <a:cs typeface="Roboto"/>
+                <a:sym typeface="Roboto"/>
+              </a:rPr>
+              <a:t>, </a:t>
+            </a:r>
+            <a:r>
+              <a:rPr lang="en-US" sz="2000" dirty="0">
+                <a:solidFill>
+                  <a:srgbClr val="262626"/>
+                </a:solidFill>
+                <a:latin typeface="Roboto"/>
+                <a:ea typeface="Roboto"/>
+                <a:cs typeface="Roboto"/>
+                <a:sym typeface="Roboto"/>
+              </a:rPr>
+              <a:t>LINQ to SQL</a:t>
+            </a:r>
+            <a:r>
+              <a:rPr lang="ru-RU" sz="2000" dirty="0">
+                <a:solidFill>
+                  <a:srgbClr val="262626"/>
+                </a:solidFill>
+                <a:latin typeface="Roboto"/>
+                <a:ea typeface="Roboto"/>
+                <a:cs typeface="Roboto"/>
+                <a:sym typeface="Roboto"/>
+              </a:rPr>
+              <a:t>, трансирует этот запрос в базу данных в виде </a:t>
+            </a:r>
+            <a:r>
+              <a:rPr lang="en-US" sz="2000" dirty="0">
+                <a:solidFill>
+                  <a:srgbClr val="262626"/>
+                </a:solidFill>
+                <a:latin typeface="Roboto"/>
+                <a:ea typeface="Roboto"/>
+                <a:cs typeface="Roboto"/>
+                <a:sym typeface="Roboto"/>
+              </a:rPr>
+              <a:t>SQL </a:t>
+            </a:r>
+            <a:r>
+              <a:rPr lang="ru-RU" sz="2000" dirty="0">
+                <a:solidFill>
+                  <a:srgbClr val="262626"/>
+                </a:solidFill>
+                <a:latin typeface="Roboto"/>
+                <a:ea typeface="Roboto"/>
+                <a:cs typeface="Roboto"/>
+                <a:sym typeface="Roboto"/>
+              </a:rPr>
+              <a:t>запроса.</a:t>
+            </a:r>
+          </a:p>
+        </p:txBody>
+      </p:sp>
+    </p:spTree>
+    <p:extLst>
+      <p:ext uri="{BB962C8B-B14F-4D97-AF65-F5344CB8AC3E}">
+        <p14:creationId xmlns:p14="http://schemas.microsoft.com/office/powerpoint/2010/main" val="901432929"/>
+      </p:ext>
+    </p:extLst>
+  </p:cSld>
+  <p:clrMapOvr>
+    <a:masterClrMapping/>
+  </p:clrMapOvr>
+  <p:transition>
+    <p:fade/>
+  </p:transition>
+</p:sld>
+</file>
+
 <file path=ppt/slides/slide2.xml><?xml version="1.0" encoding="utf-8"?>
 <p:sld xmlns:a="http://schemas.openxmlformats.org/drawingml/2006/main" xmlns:r="http://schemas.openxmlformats.org/officeDocument/2006/relationships" xmlns:p="http://schemas.openxmlformats.org/presentationml/2006/main">
   <p:cSld>
@@ -19984,9 +21647,33 @@
                 <a:cs typeface="Roboto"/>
                 <a:sym typeface="Roboto"/>
               </a:rPr>
-              <a:t>DbModelBuilder</a:t>
+              <a:t>DbContextOptions</a:t>
             </a:r>
-            <a:endParaRPr sz="2000" b="1" i="0" u="none" strike="noStrike" cap="none" dirty="0">
+            <a:r>
+              <a:rPr lang="ru-RU" sz="2000" b="1" dirty="0">
+                <a:solidFill>
+                  <a:schemeClr val="tx1"/>
+                </a:solidFill>
+                <a:latin typeface="Roboto"/>
+                <a:ea typeface="Roboto"/>
+                <a:cs typeface="Roboto"/>
+                <a:sym typeface="Roboto"/>
+              </a:rPr>
+              <a:t> </a:t>
+            </a:r>
+            <a:r>
+              <a:rPr lang="ru-RU" sz="2000" dirty="0">
+                <a:solidFill>
+                  <a:schemeClr val="tx1"/>
+                </a:solidFill>
+                <a:latin typeface="Roboto"/>
+                <a:ea typeface="Roboto"/>
+                <a:cs typeface="Roboto"/>
+                <a:sym typeface="Roboto"/>
+              </a:rPr>
+              <a:t>– устанавливает параметры подключения</a:t>
+            </a:r>
+            <a:endParaRPr sz="2000" i="0" u="none" strike="noStrike" cap="none" dirty="0">
               <a:solidFill>
                 <a:schemeClr val="tx1"/>
               </a:solidFill>
@@ -20047,7 +21734,91 @@
               </a:rPr>
               <a:t>DbSet</a:t>
             </a:r>
-            <a:endParaRPr lang="en-US" sz="2000" b="1" i="0" u="none" strike="noStrike" cap="none" dirty="0">
+            <a:r>
+              <a:rPr lang="en-US" sz="2000" b="1" dirty="0">
+                <a:solidFill>
+                  <a:schemeClr val="tx1"/>
+                </a:solidFill>
+                <a:latin typeface="Roboto"/>
+                <a:ea typeface="Roboto"/>
+                <a:cs typeface="Roboto"/>
+                <a:sym typeface="Roboto"/>
+              </a:rPr>
+              <a:t>/</a:t>
+            </a:r>
+            <a:r>
+              <a:rPr lang="en-US" sz="2000" b="1" dirty="0" err="1">
+                <a:solidFill>
+                  <a:schemeClr val="tx1"/>
+                </a:solidFill>
+                <a:latin typeface="Roboto"/>
+                <a:ea typeface="Roboto"/>
+                <a:cs typeface="Roboto"/>
+                <a:sym typeface="Roboto"/>
+              </a:rPr>
+              <a:t>DbSet</a:t>
+            </a:r>
+            <a:r>
+              <a:rPr lang="en-US" sz="2000" b="1" dirty="0">
+                <a:solidFill>
+                  <a:schemeClr val="tx1"/>
+                </a:solidFill>
+                <a:latin typeface="Roboto"/>
+                <a:ea typeface="Roboto"/>
+                <a:cs typeface="Roboto"/>
+                <a:sym typeface="Roboto"/>
+              </a:rPr>
+              <a:t>&lt;</a:t>
+            </a:r>
+            <a:r>
+              <a:rPr lang="en-US" sz="2000" b="1" dirty="0" err="1">
+                <a:solidFill>
+                  <a:schemeClr val="tx1"/>
+                </a:solidFill>
+                <a:latin typeface="Roboto"/>
+                <a:ea typeface="Roboto"/>
+                <a:cs typeface="Roboto"/>
+                <a:sym typeface="Roboto"/>
+              </a:rPr>
+              <a:t>TEntity</a:t>
+            </a:r>
+            <a:r>
+              <a:rPr lang="en-US" sz="2000" b="1" dirty="0">
+                <a:solidFill>
+                  <a:schemeClr val="tx1"/>
+                </a:solidFill>
+                <a:latin typeface="Roboto"/>
+                <a:ea typeface="Roboto"/>
+                <a:cs typeface="Roboto"/>
+                <a:sym typeface="Roboto"/>
+              </a:rPr>
+              <a:t>&gt;</a:t>
+            </a:r>
+            <a:r>
+              <a:rPr lang="ru-RU" sz="2000" b="1" dirty="0">
+                <a:solidFill>
+                  <a:schemeClr val="tx1"/>
+                </a:solidFill>
+                <a:latin typeface="Roboto"/>
+                <a:ea typeface="Roboto"/>
+                <a:cs typeface="Roboto"/>
+                <a:sym typeface="Roboto"/>
+              </a:rPr>
+              <a:t> </a:t>
+            </a:r>
+            <a:r>
+              <a:rPr lang="ru-RU" sz="2000" dirty="0">
+                <a:solidFill>
+                  <a:schemeClr val="tx1"/>
+                </a:solidFill>
+                <a:latin typeface="Roboto"/>
+                <a:ea typeface="Roboto"/>
+                <a:cs typeface="Roboto"/>
+                <a:sym typeface="Roboto"/>
+              </a:rPr>
+              <a:t>- представляет сущности проецируемые на БД</a:t>
+            </a:r>
+            <a:endParaRPr lang="en-US" sz="2000" i="0" u="none" strike="noStrike" cap="none" dirty="0">
               <a:solidFill>
                 <a:schemeClr val="tx1"/>
               </a:solidFill>
@@ -20074,7 +21845,7 @@
         <p:spPr>
           <a:xfrm>
             <a:off x="1379707" y="2416452"/>
-            <a:ext cx="6840900" cy="1012500"/>
+            <a:ext cx="7126340" cy="1012500"/>
           </a:xfrm>
           <a:prstGeom prst="rect">
             <a:avLst/>
@@ -20116,7 +21887,55 @@
               </a:rPr>
               <a:t>DbContext</a:t>
             </a:r>
-            <a:endParaRPr sz="2000" b="1" i="0" u="none" strike="noStrike" cap="none" dirty="0">
+            <a:r>
+              <a:rPr lang="en-US" sz="2000" b="1" i="0" u="none" strike="noStrike" cap="none" dirty="0">
+                <a:solidFill>
+                  <a:srgbClr val="262626"/>
+                </a:solidFill>
+                <a:latin typeface="Roboto"/>
+                <a:ea typeface="Roboto"/>
+                <a:cs typeface="Roboto"/>
+                <a:sym typeface="Roboto"/>
+              </a:rPr>
+              <a:t> </a:t>
+            </a:r>
+            <a:r>
+              <a:rPr lang="en-US" sz="2000" i="0" u="none" strike="noStrike" cap="none" dirty="0">
+                <a:solidFill>
+                  <a:srgbClr val="262626"/>
+                </a:solidFill>
+                <a:latin typeface="Roboto"/>
+                <a:ea typeface="Roboto"/>
+                <a:cs typeface="Roboto"/>
+                <a:sym typeface="Roboto"/>
+              </a:rPr>
+              <a:t>–</a:t>
+            </a:r>
+            <a:r>
+              <a:rPr lang="en-US" sz="2000" b="1" i="0" u="none" strike="noStrike" cap="none" dirty="0">
+                <a:solidFill>
+                  <a:srgbClr val="262626"/>
+                </a:solidFill>
+                <a:latin typeface="Roboto"/>
+                <a:ea typeface="Roboto"/>
+                <a:cs typeface="Roboto"/>
+                <a:sym typeface="Roboto"/>
+              </a:rPr>
+              <a:t> </a:t>
+            </a:r>
+            <a:r>
+              <a:rPr lang="ru-RU" sz="2000" dirty="0">
+                <a:solidFill>
+                  <a:srgbClr val="262626"/>
+                </a:solidFill>
+                <a:latin typeface="Roboto"/>
+                <a:ea typeface="Roboto"/>
+                <a:cs typeface="Roboto"/>
+                <a:sym typeface="Roboto"/>
+              </a:rPr>
+              <a:t>определеяет контекст взаимодействия с БД</a:t>
+            </a:r>
+            <a:endParaRPr sz="2000" i="0" u="none" strike="noStrike" cap="none" dirty="0">
               <a:solidFill>
                 <a:srgbClr val="A5A5A5"/>
               </a:solidFill>
@@ -20187,7 +22006,31 @@
                 <a:cs typeface="Roboto"/>
                 <a:sym typeface="Roboto"/>
               </a:rPr>
-              <a:t>Entity Framework </a:t>
+              <a:t>Entity Framework</a:t>
+            </a:r>
+            <a:r>
+              <a:rPr lang="ru-RU" sz="2000" dirty="0">
+                <a:solidFill>
+                  <a:srgbClr val="262626"/>
+                </a:solidFill>
+                <a:latin typeface="Roboto"/>
+                <a:ea typeface="Roboto"/>
+                <a:cs typeface="Roboto"/>
+                <a:sym typeface="Roboto"/>
+              </a:rPr>
+              <a:t> </a:t>
+            </a:r>
+            <a:r>
+              <a:rPr lang="en-US" sz="2000" dirty="0">
+                <a:solidFill>
+                  <a:srgbClr val="262626"/>
+                </a:solidFill>
+                <a:latin typeface="Roboto"/>
+                <a:ea typeface="Roboto"/>
+                <a:cs typeface="Roboto"/>
+                <a:sym typeface="Roboto"/>
+              </a:rPr>
+              <a:t>Core </a:t>
             </a:r>
             <a:r>
               <a:rPr lang="ru-RU" sz="2000" dirty="0">
@@ -20211,7 +22054,7 @@
                 <a:cs typeface="Roboto"/>
                 <a:sym typeface="Roboto"/>
               </a:rPr>
-              <a:t>System.Data.Entity</a:t>
+              <a:t>Microsoft.EntityFrameworkCore</a:t>
             </a:r>
             <a:r>
               <a:rPr lang="en-US" sz="2000" dirty="0">
@@ -20240,7 +22083,7 @@
     </p:spTree>
     <p:extLst>
       <p:ext uri="{BB962C8B-B14F-4D97-AF65-F5344CB8AC3E}">
-        <p14:creationId xmlns:p14="http://schemas.microsoft.com/office/powerpoint/2010/main" val="3550932366"/>
+        <p14:creationId xmlns:p14="http://schemas.microsoft.com/office/powerpoint/2010/main" val="2692374318"/>
       </p:ext>
     </p:extLst>
   </p:cSld>
@@ -20871,7 +22714,7 @@
         </p:nvSpPr>
         <p:spPr>
           <a:xfrm>
-            <a:off x="443176" y="1370975"/>
+            <a:off x="457200" y="1540777"/>
             <a:ext cx="8229600" cy="1143000"/>
           </a:xfrm>
           <a:prstGeom prst="rect">
@@ -20912,19 +22755,7 @@
                 <a:cs typeface="Roboto"/>
                 <a:sym typeface="Roboto"/>
               </a:rPr>
-              <a:t> </a:t>
-            </a:r>
-            <a:r>
-              <a:rPr lang="en-US" sz="4100" b="1" dirty="0">
-                <a:solidFill>
-                  <a:srgbClr val="262626"/>
-                </a:solidFill>
-                <a:latin typeface="Roboto"/>
-                <a:ea typeface="Roboto"/>
-                <a:cs typeface="Roboto"/>
-                <a:sym typeface="Roboto"/>
-              </a:rPr>
-              <a:t>LINQ to SQL</a:t>
+              <a:t>Основные комманды миграций</a:t>
             </a:r>
             <a:endParaRPr sz="4100" b="1" i="0" u="none" strike="noStrike" cap="none" dirty="0">
               <a:solidFill>
@@ -21123,8 +22954,8 @@
         </p:nvSpPr>
         <p:spPr>
           <a:xfrm>
-            <a:off x="443176" y="2513975"/>
-            <a:ext cx="8181300" cy="3853874"/>
+            <a:off x="509858" y="2683777"/>
+            <a:ext cx="8181300" cy="2918148"/>
           </a:xfrm>
           <a:prstGeom prst="rect">
             <a:avLst/>
@@ -21140,19 +22971,541 @@
           </a:bodyPr>
           <a:lstStyle/>
           <a:p>
-            <a:pPr lvl="0" indent="-12700">
-              <a:spcAft>
-                <a:spcPts val="1200"/>
+            <a:pPr marL="0" marR="0" lvl="0" indent="-12700" algn="l" rtl="0">
+              <a:lnSpc>
+                <a:spcPct val="200000"/>
+              </a:lnSpc>
+              <a:spcBef>
+                <a:spcPts val="0"/>
+              </a:spcBef>
+              <a:spcAft>
+                <a:spcPts val="0"/>
               </a:spcAft>
               <a:buSzPts val="2000"/>
               <a:buFont typeface="Noto Sans Symbols"/>
               <a:buChar char="▪"/>
             </a:pPr>
             <a:r>
-              <a:rPr lang="ru-RU" sz="2000" b="1" dirty="0">
+              <a:rPr lang="en-US" sz="2000" dirty="0">
+                <a:latin typeface="Roboto"/>
+                <a:ea typeface="Roboto"/>
+                <a:sym typeface="Calibri"/>
+              </a:rPr>
+              <a:t> </a:t>
+            </a:r>
+            <a:r>
+              <a:rPr lang="en-US" sz="2000" b="1" dirty="0">
+                <a:latin typeface="Roboto"/>
+                <a:ea typeface="Roboto"/>
+                <a:sym typeface="Roboto"/>
+              </a:rPr>
+              <a:t>Add-Migration {Name} </a:t>
+            </a:r>
+            <a:r>
+              <a:rPr lang="en-US" sz="2000" dirty="0">
+                <a:latin typeface="Roboto"/>
+                <a:ea typeface="Roboto"/>
+                <a:sym typeface="Roboto"/>
+              </a:rPr>
+              <a:t>– </a:t>
+            </a:r>
+            <a:r>
+              <a:rPr lang="ru-RU" sz="2000" dirty="0">
+                <a:latin typeface="Roboto"/>
+                <a:ea typeface="Roboto"/>
+                <a:sym typeface="Roboto"/>
+              </a:rPr>
+              <a:t>Создание миграции</a:t>
+            </a:r>
+          </a:p>
+          <a:p>
+            <a:pPr marL="0" marR="0" lvl="0" indent="-12700" algn="l" rtl="0">
+              <a:lnSpc>
+                <a:spcPct val="200000"/>
+              </a:lnSpc>
+              <a:spcBef>
+                <a:spcPts val="0"/>
+              </a:spcBef>
+              <a:spcAft>
+                <a:spcPts val="0"/>
+              </a:spcAft>
+              <a:buSzPts val="2000"/>
+              <a:buFont typeface="Noto Sans Symbols"/>
+              <a:buChar char="▪"/>
+            </a:pPr>
+            <a:r>
+              <a:rPr lang="ru-RU" sz="2000" dirty="0">
+                <a:latin typeface="Roboto"/>
+                <a:ea typeface="Roboto"/>
+                <a:sym typeface="Roboto"/>
+              </a:rPr>
+              <a:t> </a:t>
+            </a:r>
+            <a:r>
+              <a:rPr lang="en-US" sz="2000" b="1" dirty="0">
+                <a:latin typeface="Roboto"/>
+                <a:ea typeface="Roboto"/>
+                <a:sym typeface="Roboto"/>
+              </a:rPr>
+              <a:t>Update-Database</a:t>
+            </a:r>
+            <a:r>
+              <a:rPr lang="en-US" sz="2000" dirty="0">
+                <a:latin typeface="Roboto"/>
+                <a:ea typeface="Roboto"/>
+                <a:sym typeface="Roboto"/>
+              </a:rPr>
+              <a:t> </a:t>
+            </a:r>
+            <a:r>
+              <a:rPr lang="ru-RU" sz="2000" dirty="0">
+                <a:latin typeface="Roboto"/>
+                <a:ea typeface="Roboto"/>
+                <a:sym typeface="Roboto"/>
+              </a:rPr>
+              <a:t>– Применить миграцию</a:t>
+            </a:r>
+          </a:p>
+          <a:p>
+            <a:pPr marL="0" marR="0" lvl="0" indent="-12700" algn="l" rtl="0">
+              <a:lnSpc>
+                <a:spcPct val="200000"/>
+              </a:lnSpc>
+              <a:spcBef>
+                <a:spcPts val="0"/>
+              </a:spcBef>
+              <a:spcAft>
+                <a:spcPts val="0"/>
+              </a:spcAft>
+              <a:buSzPts val="2000"/>
+              <a:buFont typeface="Noto Sans Symbols"/>
+              <a:buChar char="▪"/>
+            </a:pPr>
+            <a:r>
+              <a:rPr lang="ru-RU" sz="2000" dirty="0">
+                <a:solidFill>
+                  <a:srgbClr val="424C53"/>
+                </a:solidFill>
+                <a:latin typeface="Roboto"/>
+                <a:ea typeface="Roboto"/>
+                <a:cs typeface="Calibri"/>
+                <a:sym typeface="Roboto"/>
+              </a:rPr>
+              <a:t> </a:t>
+            </a:r>
+            <a:r>
+              <a:rPr lang="en-US" sz="2000" b="1" dirty="0">
+                <a:latin typeface="Roboto"/>
+                <a:ea typeface="Roboto"/>
+                <a:sym typeface="Roboto"/>
+              </a:rPr>
+              <a:t>Update-Database {Name} </a:t>
+            </a:r>
+            <a:r>
+              <a:rPr lang="en-US" sz="2000" dirty="0">
+                <a:latin typeface="Roboto"/>
+                <a:ea typeface="Roboto"/>
+                <a:sym typeface="Roboto"/>
+              </a:rPr>
+              <a:t>– </a:t>
+            </a:r>
+            <a:r>
+              <a:rPr lang="ru-RU" sz="2000" dirty="0">
+                <a:latin typeface="Roboto"/>
+                <a:ea typeface="Roboto"/>
+                <a:sym typeface="Roboto"/>
+              </a:rPr>
+              <a:t>Указывая имя миграции можно </a:t>
+            </a:r>
+            <a:endParaRPr lang="en-US" sz="2000" dirty="0">
+              <a:latin typeface="Roboto"/>
+              <a:ea typeface="Roboto"/>
+              <a:sym typeface="Roboto"/>
+            </a:endParaRPr>
+          </a:p>
+          <a:p>
+            <a:pPr marL="0" marR="0" lvl="0" indent="-12700" algn="l" rtl="0">
+              <a:lnSpc>
+                <a:spcPct val="200000"/>
+              </a:lnSpc>
+              <a:spcBef>
+                <a:spcPts val="0"/>
+              </a:spcBef>
+              <a:spcAft>
+                <a:spcPts val="0"/>
+              </a:spcAft>
+              <a:buSzPts val="2000"/>
+              <a:buFont typeface="Noto Sans Symbols"/>
+              <a:buChar char="▪"/>
+            </a:pPr>
+            <a:r>
+              <a:rPr lang="en-US" sz="2000" dirty="0">
+                <a:latin typeface="Roboto"/>
+                <a:ea typeface="Roboto"/>
+                <a:sym typeface="Roboto"/>
+              </a:rPr>
+              <a:t> </a:t>
+            </a:r>
+            <a:r>
+              <a:rPr lang="en-US" sz="2000" b="1" dirty="0">
+                <a:latin typeface="Roboto"/>
+                <a:ea typeface="Roboto"/>
+                <a:sym typeface="Roboto"/>
+              </a:rPr>
+              <a:t>Remove-Migration</a:t>
+            </a:r>
+            <a:r>
+              <a:rPr lang="en-US" sz="2000" dirty="0">
+                <a:latin typeface="Roboto"/>
+                <a:ea typeface="Roboto"/>
+                <a:sym typeface="Roboto"/>
+              </a:rPr>
+              <a:t> </a:t>
+            </a:r>
+            <a:r>
+              <a:rPr lang="ru-RU" sz="2000" dirty="0">
+                <a:latin typeface="Roboto"/>
+                <a:ea typeface="Roboto"/>
+                <a:sym typeface="Roboto"/>
+              </a:rPr>
+              <a:t>– Удалить текущую миграцию</a:t>
+            </a:r>
+            <a:endParaRPr sz="2000" i="0" u="none" strike="noStrike" cap="none" dirty="0">
+              <a:latin typeface="Roboto"/>
+              <a:ea typeface="Roboto"/>
+              <a:cs typeface="Roboto"/>
+              <a:sym typeface="Roboto"/>
+            </a:endParaRPr>
+          </a:p>
+        </p:txBody>
+      </p:sp>
+    </p:spTree>
+    <p:extLst>
+      <p:ext uri="{BB962C8B-B14F-4D97-AF65-F5344CB8AC3E}">
+        <p14:creationId xmlns:p14="http://schemas.microsoft.com/office/powerpoint/2010/main" val="1295434084"/>
+      </p:ext>
+    </p:extLst>
+  </p:cSld>
+  <p:clrMapOvr>
+    <a:masterClrMapping/>
+  </p:clrMapOvr>
+  <p:transition>
+    <p:fade/>
+  </p:transition>
+</p:sld>
+</file>
+
+<file path=ppt/slides/slide8.xml><?xml version="1.0" encoding="utf-8"?>
+<p:sld xmlns:a="http://schemas.openxmlformats.org/drawingml/2006/main" xmlns:r="http://schemas.openxmlformats.org/officeDocument/2006/relationships" xmlns:p="http://schemas.openxmlformats.org/presentationml/2006/main">
+  <p:cSld>
+    <p:spTree>
+      <p:nvGrpSpPr>
+        <p:cNvPr id="1" name="Shape 156"/>
+        <p:cNvGrpSpPr/>
+        <p:nvPr/>
+      </p:nvGrpSpPr>
+      <p:grpSpPr>
+        <a:xfrm>
+          <a:off x="0" y="0"/>
+          <a:ext cx="0" cy="0"/>
+          <a:chOff x="0" y="0"/>
+          <a:chExt cx="0" cy="0"/>
+        </a:xfrm>
+      </p:grpSpPr>
+      <p:sp>
+        <p:nvSpPr>
+          <p:cNvPr id="158" name="Shape 158"/>
+          <p:cNvSpPr txBox="1">
+            <a:spLocks noGrp="1"/>
+          </p:cNvSpPr>
+          <p:nvPr>
+            <p:ph type="title"/>
+          </p:nvPr>
+        </p:nvSpPr>
+        <p:spPr>
+          <a:xfrm>
+            <a:off x="467326" y="1661282"/>
+            <a:ext cx="8229600" cy="1143000"/>
+          </a:xfrm>
+          <a:prstGeom prst="rect">
+            <a:avLst/>
+          </a:prstGeom>
+          <a:noFill/>
+          <a:ln>
+            <a:noFill/>
+          </a:ln>
+        </p:spPr>
+        <p:txBody>
+          <a:bodyPr spcFirstLastPara="1" wrap="square" lIns="91425" tIns="45700" rIns="91425" bIns="45700" anchor="ctr" anchorCtr="0">
+            <a:noAutofit/>
+          </a:bodyPr>
+          <a:lstStyle/>
+          <a:p>
+            <a:pPr marL="0" marR="0" lvl="0" indent="0" algn="l" rtl="0">
+              <a:spcBef>
+                <a:spcPts val="0"/>
+              </a:spcBef>
+              <a:spcAft>
+                <a:spcPts val="0"/>
+              </a:spcAft>
+              <a:buClr>
+                <a:schemeClr val="dk1"/>
+              </a:buClr>
+              <a:buSzPts val="4400"/>
+              <a:buFont typeface="Calibri"/>
+              <a:buNone/>
+            </a:pPr>
+            <a:r>
+              <a:rPr lang="ru-RU" sz="4100" b="1" i="0" u="none" strike="noStrike" cap="none" dirty="0">
                 <a:solidFill>
                   <a:srgbClr val="262626"/>
                 </a:solidFill>
+                <a:latin typeface="Roboto"/>
+                <a:ea typeface="Roboto"/>
+                <a:cs typeface="Roboto"/>
+                <a:sym typeface="Roboto"/>
+              </a:rPr>
+              <a:t>Определение навигационного свойства в </a:t>
+            </a:r>
+            <a:r>
+              <a:rPr lang="en-US" sz="4100" b="1" i="0" u="none" strike="noStrike" cap="none" dirty="0">
+                <a:solidFill>
+                  <a:srgbClr val="262626"/>
+                </a:solidFill>
+                <a:latin typeface="Roboto"/>
+                <a:ea typeface="Roboto"/>
+                <a:cs typeface="Roboto"/>
+                <a:sym typeface="Roboto"/>
+              </a:rPr>
+              <a:t>EF Core</a:t>
+            </a:r>
+            <a:endParaRPr sz="4100" b="1" i="0" u="none" strike="noStrike" cap="none" dirty="0">
+              <a:solidFill>
+                <a:srgbClr val="262626"/>
+              </a:solidFill>
+              <a:latin typeface="Roboto"/>
+              <a:ea typeface="Roboto"/>
+              <a:cs typeface="Roboto"/>
+              <a:sym typeface="Roboto"/>
+            </a:endParaRPr>
+          </a:p>
+        </p:txBody>
+      </p:sp>
+      <p:sp>
+        <p:nvSpPr>
+          <p:cNvPr id="159" name="Shape 159"/>
+          <p:cNvSpPr/>
+          <p:nvPr/>
+        </p:nvSpPr>
+        <p:spPr>
+          <a:xfrm>
+            <a:off x="7145316" y="408237"/>
+            <a:ext cx="1856100" cy="290400"/>
+          </a:xfrm>
+          <a:prstGeom prst="roundRect">
+            <a:avLst>
+              <a:gd name="adj" fmla="val 0"/>
+            </a:avLst>
+          </a:prstGeom>
+          <a:noFill/>
+          <a:ln>
+            <a:noFill/>
+          </a:ln>
+        </p:spPr>
+        <p:txBody>
+          <a:bodyPr spcFirstLastPara="1" wrap="square" lIns="91425" tIns="45700" rIns="91425" bIns="45700" anchor="ctr" anchorCtr="0">
+            <a:noAutofit/>
+          </a:bodyPr>
+          <a:lstStyle/>
+          <a:p>
+            <a:pPr marL="0" marR="0" lvl="0" indent="0" algn="ctr" rtl="0">
+              <a:spcBef>
+                <a:spcPts val="0"/>
+              </a:spcBef>
+              <a:spcAft>
+                <a:spcPts val="0"/>
+              </a:spcAft>
+              <a:buClr>
+                <a:schemeClr val="lt1"/>
+              </a:buClr>
+              <a:buSzPts val="1200"/>
+              <a:buFont typeface="Arial"/>
+              <a:buNone/>
+            </a:pPr>
+            <a:r>
+              <a:rPr lang="en-US" sz="1500" b="1" i="0" strike="noStrike" cap="none">
+                <a:solidFill>
+                  <a:srgbClr val="262626"/>
+                </a:solidFill>
+                <a:latin typeface="Roboto"/>
+                <a:ea typeface="Roboto"/>
+                <a:cs typeface="Roboto"/>
+                <a:sym typeface="Roboto"/>
+              </a:rPr>
+              <a:t>www.itea.ua</a:t>
+            </a:r>
+            <a:endParaRPr sz="1500" b="1" i="0" strike="noStrike" cap="none">
+              <a:solidFill>
+                <a:srgbClr val="262626"/>
+              </a:solidFill>
+              <a:latin typeface="Roboto"/>
+              <a:ea typeface="Roboto"/>
+              <a:cs typeface="Roboto"/>
+              <a:sym typeface="Roboto"/>
+            </a:endParaRPr>
+          </a:p>
+        </p:txBody>
+      </p:sp>
+      <p:sp>
+        <p:nvSpPr>
+          <p:cNvPr id="160" name="Shape 160"/>
+          <p:cNvSpPr/>
+          <p:nvPr/>
+        </p:nvSpPr>
+        <p:spPr>
+          <a:xfrm rot="10800000" flipH="1">
+            <a:off x="0" y="1127850"/>
+            <a:ext cx="3143100" cy="42300"/>
+          </a:xfrm>
+          <a:prstGeom prst="rect">
+            <a:avLst/>
+          </a:prstGeom>
+          <a:solidFill>
+            <a:srgbClr val="CC0000"/>
+          </a:solidFill>
+          <a:ln>
+            <a:noFill/>
+          </a:ln>
+        </p:spPr>
+        <p:txBody>
+          <a:bodyPr spcFirstLastPara="1" wrap="square" lIns="91425" tIns="91425" rIns="91425" bIns="91425" anchor="ctr" anchorCtr="0">
+            <a:noAutofit/>
+          </a:bodyPr>
+          <a:lstStyle/>
+          <a:p>
+            <a:pPr marL="0" lvl="0" indent="0">
+              <a:spcBef>
+                <a:spcPts val="0"/>
+              </a:spcBef>
+              <a:spcAft>
+                <a:spcPts val="0"/>
+              </a:spcAft>
+              <a:buNone/>
+            </a:pPr>
+            <a:r>
+              <a:rPr lang="en-US"/>
+              <a:t>                                                                                     </a:t>
+            </a:r>
+            <a:endParaRPr/>
+          </a:p>
+        </p:txBody>
+      </p:sp>
+      <p:sp>
+        <p:nvSpPr>
+          <p:cNvPr id="161" name="Shape 161"/>
+          <p:cNvSpPr/>
+          <p:nvPr/>
+        </p:nvSpPr>
+        <p:spPr>
+          <a:xfrm rot="10800000" flipH="1">
+            <a:off x="3067050" y="1127850"/>
+            <a:ext cx="3143100" cy="42300"/>
+          </a:xfrm>
+          <a:prstGeom prst="rect">
+            <a:avLst/>
+          </a:prstGeom>
+          <a:solidFill>
+            <a:srgbClr val="262626"/>
+          </a:solidFill>
+          <a:ln>
+            <a:noFill/>
+          </a:ln>
+        </p:spPr>
+        <p:txBody>
+          <a:bodyPr spcFirstLastPara="1" wrap="square" lIns="91425" tIns="91425" rIns="91425" bIns="91425" anchor="ctr" anchorCtr="0">
+            <a:noAutofit/>
+          </a:bodyPr>
+          <a:lstStyle/>
+          <a:p>
+            <a:pPr marL="0" lvl="0" indent="0">
+              <a:spcBef>
+                <a:spcPts val="0"/>
+              </a:spcBef>
+              <a:spcAft>
+                <a:spcPts val="0"/>
+              </a:spcAft>
+              <a:buNone/>
+            </a:pPr>
+            <a:endParaRPr/>
+          </a:p>
+        </p:txBody>
+      </p:sp>
+      <p:pic>
+        <p:nvPicPr>
+          <p:cNvPr id="162" name="Shape 162"/>
+          <p:cNvPicPr preferRelativeResize="0"/>
+          <p:nvPr/>
+        </p:nvPicPr>
+        <p:blipFill>
+          <a:blip r:embed="rId3">
+            <a:alphaModFix/>
+          </a:blip>
+          <a:stretch>
+            <a:fillRect/>
+          </a:stretch>
+        </p:blipFill>
+        <p:spPr>
+          <a:xfrm>
+            <a:off x="353700" y="302000"/>
+            <a:ext cx="1741800" cy="502875"/>
+          </a:xfrm>
+          <a:prstGeom prst="rect">
+            <a:avLst/>
+          </a:prstGeom>
+          <a:noFill/>
+          <a:ln>
+            <a:noFill/>
+          </a:ln>
+        </p:spPr>
+      </p:pic>
+      <p:sp>
+        <p:nvSpPr>
+          <p:cNvPr id="163" name="Shape 163"/>
+          <p:cNvSpPr txBox="1"/>
+          <p:nvPr/>
+        </p:nvSpPr>
+        <p:spPr>
+          <a:xfrm>
+            <a:off x="467326" y="2804282"/>
+            <a:ext cx="8181300" cy="3074100"/>
+          </a:xfrm>
+          <a:prstGeom prst="rect">
+            <a:avLst/>
+          </a:prstGeom>
+          <a:noFill/>
+          <a:ln>
+            <a:noFill/>
+          </a:ln>
+        </p:spPr>
+        <p:txBody>
+          <a:bodyPr spcFirstLastPara="1" wrap="square" lIns="91425" tIns="45700" rIns="91425" bIns="45700" anchor="ctr" anchorCtr="0">
+            <a:noAutofit/>
+          </a:bodyPr>
+          <a:lstStyle/>
+          <a:p>
+            <a:pPr marL="0" marR="0" lvl="0" indent="-12700" algn="l" rtl="0">
+              <a:spcBef>
+                <a:spcPts val="0"/>
+              </a:spcBef>
+              <a:spcAft>
+                <a:spcPts val="0"/>
+              </a:spcAft>
+              <a:buSzPts val="2000"/>
+              <a:buFont typeface="Noto Sans Symbols"/>
+              <a:buChar char="▪"/>
+            </a:pPr>
+            <a:r>
+              <a:rPr lang="en-US" sz="2000" dirty="0">
                 <a:latin typeface="Roboto"/>
                 <a:ea typeface="Roboto"/>
                 <a:cs typeface="Roboto"/>
@@ -21161,58 +23514,41 @@
               <a:t> </a:t>
             </a:r>
             <a:r>
-              <a:rPr lang="en-US" sz="2000" b="1" dirty="0">
-                <a:solidFill>
-                  <a:srgbClr val="262626"/>
-                </a:solidFill>
+              <a:rPr lang="ru-RU" sz="2000" dirty="0">
                 <a:latin typeface="Roboto"/>
                 <a:ea typeface="Roboto"/>
                 <a:cs typeface="Roboto"/>
                 <a:sym typeface="Roboto"/>
               </a:rPr>
-              <a:t>LINQ to SQL </a:t>
-            </a:r>
-            <a:r>
-              <a:rPr lang="ru-RU" sz="2000" dirty="0">
-                <a:solidFill>
-                  <a:srgbClr val="262626"/>
-                </a:solidFill>
-                <a:latin typeface="Roboto"/>
-                <a:ea typeface="Roboto"/>
-                <a:cs typeface="Roboto"/>
-                <a:sym typeface="Roboto"/>
-              </a:rPr>
-              <a:t>– это компонент </a:t>
-            </a:r>
-            <a:r>
-              <a:rPr lang="en-US" sz="2000" dirty="0">
-                <a:solidFill>
-                  <a:srgbClr val="262626"/>
-                </a:solidFill>
-                <a:latin typeface="Roboto"/>
-                <a:ea typeface="Roboto"/>
-                <a:cs typeface="Roboto"/>
-                <a:sym typeface="Roboto"/>
-              </a:rPr>
-              <a:t>.NET Framework</a:t>
-            </a:r>
-            <a:r>
-              <a:rPr lang="ru-RU" sz="2000" dirty="0">
-                <a:solidFill>
-                  <a:srgbClr val="262626"/>
-                </a:solidFill>
-                <a:latin typeface="Roboto"/>
-                <a:ea typeface="Roboto"/>
-                <a:cs typeface="Roboto"/>
-                <a:sym typeface="Roboto"/>
-              </a:rPr>
-              <a:t>, который позволяет работать с реляционными структурами как с обьектами. </a:t>
+              <a:t>Навигационным свойством считается свойство, тип которого не подпадает не под один из стандартных типов БД.</a:t>
             </a:r>
           </a:p>
           <a:p>
-            <a:pPr lvl="0" indent="-12700">
-              <a:spcAft>
-                <a:spcPts val="1200"/>
+            <a:pPr marL="0" marR="0" lvl="0" indent="-12700" algn="l" rtl="0">
+              <a:spcBef>
+                <a:spcPts val="0"/>
+              </a:spcBef>
+              <a:spcAft>
+                <a:spcPts val="0"/>
+              </a:spcAft>
+              <a:buSzPts val="2000"/>
+              <a:buFont typeface="Noto Sans Symbols"/>
+              <a:buChar char="▪"/>
+            </a:pPr>
+            <a:endParaRPr lang="ru-RU" sz="2000" dirty="0">
+              <a:latin typeface="Roboto"/>
+              <a:ea typeface="Roboto"/>
+              <a:cs typeface="Roboto"/>
+              <a:sym typeface="Roboto"/>
+            </a:endParaRPr>
+          </a:p>
+          <a:p>
+            <a:pPr marL="0" marR="0" lvl="0" indent="-12700" algn="l" rtl="0">
+              <a:spcBef>
+                <a:spcPts val="0"/>
+              </a:spcBef>
+              <a:spcAft>
+                <a:spcPts val="0"/>
               </a:spcAft>
               <a:buSzPts val="2000"/>
               <a:buFont typeface="Noto Sans Symbols"/>
@@ -21220,95 +23556,471 @@
             </a:pPr>
             <a:r>
               <a:rPr lang="ru-RU" sz="2000" dirty="0">
-                <a:solidFill>
-                  <a:srgbClr val="262626"/>
-                </a:solidFill>
                 <a:latin typeface="Roboto"/>
                 <a:ea typeface="Roboto"/>
                 <a:cs typeface="Roboto"/>
                 <a:sym typeface="Roboto"/>
               </a:rPr>
-              <a:t> Простыми словами: вы выполняете запрос используя</a:t>
+              <a:t> Можно это воспринимать так: если вы хотите создать навигационное свойство для опреденной сущности, это свойство должно быть типа этой сущности или быть типа коллекции, элементы которой совпадают с типом этой сущности. </a:t>
             </a:r>
-            <a:r>
-              <a:rPr lang="en-US" sz="2000" dirty="0">
-                <a:solidFill>
-                  <a:srgbClr val="262626"/>
-                </a:solidFill>
-                <a:latin typeface="Roboto"/>
-                <a:ea typeface="Roboto"/>
-                <a:cs typeface="Roboto"/>
-                <a:sym typeface="Roboto"/>
-              </a:rPr>
-              <a:t> LINQ</a:t>
-            </a:r>
-            <a:r>
-              <a:rPr lang="ru-RU" sz="2000" dirty="0">
-                <a:solidFill>
-                  <a:srgbClr val="262626"/>
-                </a:solidFill>
-                <a:latin typeface="Roboto"/>
-                <a:ea typeface="Roboto"/>
-                <a:cs typeface="Roboto"/>
-                <a:sym typeface="Roboto"/>
-              </a:rPr>
-              <a:t>, </a:t>
-            </a:r>
-            <a:r>
-              <a:rPr lang="en-US" sz="2000" dirty="0">
-                <a:solidFill>
-                  <a:srgbClr val="262626"/>
-                </a:solidFill>
-                <a:latin typeface="Roboto"/>
-                <a:ea typeface="Roboto"/>
-                <a:cs typeface="Roboto"/>
-                <a:sym typeface="Roboto"/>
-              </a:rPr>
-              <a:t>LINQ to SQL</a:t>
-            </a:r>
-            <a:r>
-              <a:rPr lang="ru-RU" sz="2000" dirty="0">
-                <a:solidFill>
-                  <a:srgbClr val="262626"/>
-                </a:solidFill>
-                <a:latin typeface="Roboto"/>
-                <a:ea typeface="Roboto"/>
-                <a:cs typeface="Roboto"/>
-                <a:sym typeface="Roboto"/>
-              </a:rPr>
-              <a:t>, трансирует этот запрос в базу данных в виде </a:t>
-            </a:r>
-            <a:r>
-              <a:rPr lang="en-US" sz="2000" dirty="0">
-                <a:solidFill>
-                  <a:srgbClr val="262626"/>
-                </a:solidFill>
-                <a:latin typeface="Roboto"/>
-                <a:ea typeface="Roboto"/>
-                <a:cs typeface="Roboto"/>
-                <a:sym typeface="Roboto"/>
-              </a:rPr>
-              <a:t>SQL </a:t>
-            </a:r>
-            <a:r>
-              <a:rPr lang="ru-RU" sz="2000" dirty="0">
-                <a:solidFill>
-                  <a:srgbClr val="262626"/>
-                </a:solidFill>
-                <a:latin typeface="Roboto"/>
-                <a:ea typeface="Roboto"/>
-                <a:cs typeface="Roboto"/>
-                <a:sym typeface="Roboto"/>
-              </a:rPr>
-              <a:t>запроса.</a:t>
-            </a:r>
+            <a:endParaRPr lang="en-US" sz="2000" dirty="0">
+              <a:latin typeface="Roboto"/>
+              <a:ea typeface="Roboto"/>
+              <a:cs typeface="Roboto"/>
+              <a:sym typeface="Roboto"/>
+            </a:endParaRPr>
           </a:p>
         </p:txBody>
       </p:sp>
     </p:spTree>
     <p:extLst>
       <p:ext uri="{BB962C8B-B14F-4D97-AF65-F5344CB8AC3E}">
-        <p14:creationId xmlns:p14="http://schemas.microsoft.com/office/powerpoint/2010/main" val="901432929"/>
+        <p14:creationId xmlns:p14="http://schemas.microsoft.com/office/powerpoint/2010/main" val="4164915992"/>
+      </p:ext>
+    </p:extLst>
+  </p:cSld>
+  <p:clrMapOvr>
+    <a:masterClrMapping/>
+  </p:clrMapOvr>
+  <p:transition>
+    <p:fade/>
+  </p:transition>
+</p:sld>
+</file>
+
+<file path=ppt/slides/slide9.xml><?xml version="1.0" encoding="utf-8"?>
+<p:sld xmlns:a="http://schemas.openxmlformats.org/drawingml/2006/main" xmlns:r="http://schemas.openxmlformats.org/officeDocument/2006/relationships" xmlns:p="http://schemas.openxmlformats.org/presentationml/2006/main">
+  <p:cSld>
+    <p:spTree>
+      <p:nvGrpSpPr>
+        <p:cNvPr id="1" name="Shape 156"/>
+        <p:cNvGrpSpPr/>
+        <p:nvPr/>
+      </p:nvGrpSpPr>
+      <p:grpSpPr>
+        <a:xfrm>
+          <a:off x="0" y="0"/>
+          <a:ext cx="0" cy="0"/>
+          <a:chOff x="0" y="0"/>
+          <a:chExt cx="0" cy="0"/>
+        </a:xfrm>
+      </p:grpSpPr>
+      <p:sp>
+        <p:nvSpPr>
+          <p:cNvPr id="158" name="Shape 158"/>
+          <p:cNvSpPr txBox="1">
+            <a:spLocks noGrp="1"/>
+          </p:cNvSpPr>
+          <p:nvPr>
+            <p:ph type="title"/>
+          </p:nvPr>
+        </p:nvSpPr>
+        <p:spPr>
+          <a:xfrm>
+            <a:off x="467326" y="1661282"/>
+            <a:ext cx="8229600" cy="1143000"/>
+          </a:xfrm>
+          <a:prstGeom prst="rect">
+            <a:avLst/>
+          </a:prstGeom>
+          <a:noFill/>
+          <a:ln>
+            <a:noFill/>
+          </a:ln>
+        </p:spPr>
+        <p:txBody>
+          <a:bodyPr spcFirstLastPara="1" wrap="square" lIns="91425" tIns="45700" rIns="91425" bIns="45700" anchor="ctr" anchorCtr="0">
+            <a:noAutofit/>
+          </a:bodyPr>
+          <a:lstStyle/>
+          <a:p>
+            <a:pPr marL="0" marR="0" lvl="0" indent="0" algn="l" rtl="0">
+              <a:spcBef>
+                <a:spcPts val="0"/>
+              </a:spcBef>
+              <a:spcAft>
+                <a:spcPts val="0"/>
+              </a:spcAft>
+              <a:buClr>
+                <a:schemeClr val="dk1"/>
+              </a:buClr>
+              <a:buSzPts val="4400"/>
+              <a:buFont typeface="Calibri"/>
+              <a:buNone/>
+            </a:pPr>
+            <a:r>
+              <a:rPr lang="ru-RU" sz="4100" b="1" i="0" u="none" strike="noStrike" cap="none" dirty="0">
+                <a:solidFill>
+                  <a:srgbClr val="262626"/>
+                </a:solidFill>
+                <a:latin typeface="Roboto"/>
+                <a:ea typeface="Roboto"/>
+                <a:cs typeface="Roboto"/>
+                <a:sym typeface="Roboto"/>
+              </a:rPr>
+              <a:t>Определение ссылочного ключа в </a:t>
+            </a:r>
+            <a:r>
+              <a:rPr lang="en-US" sz="4100" b="1" i="0" u="none" strike="noStrike" cap="none" dirty="0">
+                <a:solidFill>
+                  <a:srgbClr val="262626"/>
+                </a:solidFill>
+                <a:latin typeface="Roboto"/>
+                <a:ea typeface="Roboto"/>
+                <a:cs typeface="Roboto"/>
+                <a:sym typeface="Roboto"/>
+              </a:rPr>
+              <a:t>EF Core</a:t>
+            </a:r>
+            <a:endParaRPr sz="4100" b="1" i="0" u="none" strike="noStrike" cap="none" dirty="0">
+              <a:solidFill>
+                <a:srgbClr val="262626"/>
+              </a:solidFill>
+              <a:latin typeface="Roboto"/>
+              <a:ea typeface="Roboto"/>
+              <a:cs typeface="Roboto"/>
+              <a:sym typeface="Roboto"/>
+            </a:endParaRPr>
+          </a:p>
+        </p:txBody>
+      </p:sp>
+      <p:sp>
+        <p:nvSpPr>
+          <p:cNvPr id="159" name="Shape 159"/>
+          <p:cNvSpPr/>
+          <p:nvPr/>
+        </p:nvSpPr>
+        <p:spPr>
+          <a:xfrm>
+            <a:off x="7145316" y="408237"/>
+            <a:ext cx="1856100" cy="290400"/>
+          </a:xfrm>
+          <a:prstGeom prst="roundRect">
+            <a:avLst>
+              <a:gd name="adj" fmla="val 0"/>
+            </a:avLst>
+          </a:prstGeom>
+          <a:noFill/>
+          <a:ln>
+            <a:noFill/>
+          </a:ln>
+        </p:spPr>
+        <p:txBody>
+          <a:bodyPr spcFirstLastPara="1" wrap="square" lIns="91425" tIns="45700" rIns="91425" bIns="45700" anchor="ctr" anchorCtr="0">
+            <a:noAutofit/>
+          </a:bodyPr>
+          <a:lstStyle/>
+          <a:p>
+            <a:pPr marL="0" marR="0" lvl="0" indent="0" algn="ctr" rtl="0">
+              <a:spcBef>
+                <a:spcPts val="0"/>
+              </a:spcBef>
+              <a:spcAft>
+                <a:spcPts val="0"/>
+              </a:spcAft>
+              <a:buClr>
+                <a:schemeClr val="lt1"/>
+              </a:buClr>
+              <a:buSzPts val="1200"/>
+              <a:buFont typeface="Arial"/>
+              <a:buNone/>
+            </a:pPr>
+            <a:r>
+              <a:rPr lang="en-US" sz="1500" b="1" i="0" strike="noStrike" cap="none">
+                <a:solidFill>
+                  <a:srgbClr val="262626"/>
+                </a:solidFill>
+                <a:latin typeface="Roboto"/>
+                <a:ea typeface="Roboto"/>
+                <a:cs typeface="Roboto"/>
+                <a:sym typeface="Roboto"/>
+              </a:rPr>
+              <a:t>www.itea.ua</a:t>
+            </a:r>
+            <a:endParaRPr sz="1500" b="1" i="0" strike="noStrike" cap="none">
+              <a:solidFill>
+                <a:srgbClr val="262626"/>
+              </a:solidFill>
+              <a:latin typeface="Roboto"/>
+              <a:ea typeface="Roboto"/>
+              <a:cs typeface="Roboto"/>
+              <a:sym typeface="Roboto"/>
+            </a:endParaRPr>
+          </a:p>
+        </p:txBody>
+      </p:sp>
+      <p:sp>
+        <p:nvSpPr>
+          <p:cNvPr id="160" name="Shape 160"/>
+          <p:cNvSpPr/>
+          <p:nvPr/>
+        </p:nvSpPr>
+        <p:spPr>
+          <a:xfrm rot="10800000" flipH="1">
+            <a:off x="0" y="1127850"/>
+            <a:ext cx="3143100" cy="42300"/>
+          </a:xfrm>
+          <a:prstGeom prst="rect">
+            <a:avLst/>
+          </a:prstGeom>
+          <a:solidFill>
+            <a:srgbClr val="CC0000"/>
+          </a:solidFill>
+          <a:ln>
+            <a:noFill/>
+          </a:ln>
+        </p:spPr>
+        <p:txBody>
+          <a:bodyPr spcFirstLastPara="1" wrap="square" lIns="91425" tIns="91425" rIns="91425" bIns="91425" anchor="ctr" anchorCtr="0">
+            <a:noAutofit/>
+          </a:bodyPr>
+          <a:lstStyle/>
+          <a:p>
+            <a:pPr marL="0" lvl="0" indent="0">
+              <a:spcBef>
+                <a:spcPts val="0"/>
+              </a:spcBef>
+              <a:spcAft>
+                <a:spcPts val="0"/>
+              </a:spcAft>
+              <a:buNone/>
+            </a:pPr>
+            <a:r>
+              <a:rPr lang="en-US"/>
+              <a:t>                                                                                     </a:t>
+            </a:r>
+            <a:endParaRPr/>
+          </a:p>
+        </p:txBody>
+      </p:sp>
+      <p:sp>
+        <p:nvSpPr>
+          <p:cNvPr id="161" name="Shape 161"/>
+          <p:cNvSpPr/>
+          <p:nvPr/>
+        </p:nvSpPr>
+        <p:spPr>
+          <a:xfrm rot="10800000" flipH="1">
+            <a:off x="3067050" y="1127850"/>
+            <a:ext cx="3143100" cy="42300"/>
+          </a:xfrm>
+          <a:prstGeom prst="rect">
+            <a:avLst/>
+          </a:prstGeom>
+          <a:solidFill>
+            <a:srgbClr val="262626"/>
+          </a:solidFill>
+          <a:ln>
+            <a:noFill/>
+          </a:ln>
+        </p:spPr>
+        <p:txBody>
+          <a:bodyPr spcFirstLastPara="1" wrap="square" lIns="91425" tIns="91425" rIns="91425" bIns="91425" anchor="ctr" anchorCtr="0">
+            <a:noAutofit/>
+          </a:bodyPr>
+          <a:lstStyle/>
+          <a:p>
+            <a:pPr marL="0" lvl="0" indent="0">
+              <a:spcBef>
+                <a:spcPts val="0"/>
+              </a:spcBef>
+              <a:spcAft>
+                <a:spcPts val="0"/>
+              </a:spcAft>
+              <a:buNone/>
+            </a:pPr>
+            <a:endParaRPr/>
+          </a:p>
+        </p:txBody>
+      </p:sp>
+      <p:pic>
+        <p:nvPicPr>
+          <p:cNvPr id="162" name="Shape 162"/>
+          <p:cNvPicPr preferRelativeResize="0"/>
+          <p:nvPr/>
+        </p:nvPicPr>
+        <p:blipFill>
+          <a:blip r:embed="rId3">
+            <a:alphaModFix/>
+          </a:blip>
+          <a:stretch>
+            <a:fillRect/>
+          </a:stretch>
+        </p:blipFill>
+        <p:spPr>
+          <a:xfrm>
+            <a:off x="353700" y="302000"/>
+            <a:ext cx="1741800" cy="502875"/>
+          </a:xfrm>
+          <a:prstGeom prst="rect">
+            <a:avLst/>
+          </a:prstGeom>
+          <a:noFill/>
+          <a:ln>
+            <a:noFill/>
+          </a:ln>
+        </p:spPr>
+      </p:pic>
+      <p:sp>
+        <p:nvSpPr>
+          <p:cNvPr id="163" name="Shape 163"/>
+          <p:cNvSpPr txBox="1"/>
+          <p:nvPr/>
+        </p:nvSpPr>
+        <p:spPr>
+          <a:xfrm>
+            <a:off x="467326" y="2804282"/>
+            <a:ext cx="8181300" cy="3074100"/>
+          </a:xfrm>
+          <a:prstGeom prst="rect">
+            <a:avLst/>
+          </a:prstGeom>
+          <a:noFill/>
+          <a:ln>
+            <a:noFill/>
+          </a:ln>
+        </p:spPr>
+        <p:txBody>
+          <a:bodyPr spcFirstLastPara="1" wrap="square" lIns="91425" tIns="45700" rIns="91425" bIns="45700" anchor="ctr" anchorCtr="0">
+            <a:noAutofit/>
+          </a:bodyPr>
+          <a:lstStyle/>
+          <a:p>
+            <a:pPr marL="0" marR="0" lvl="0" indent="-12700" algn="l" rtl="0">
+              <a:spcBef>
+                <a:spcPts val="0"/>
+              </a:spcBef>
+              <a:spcAft>
+                <a:spcPts val="0"/>
+              </a:spcAft>
+              <a:buSzPts val="2000"/>
+              <a:buFont typeface="Noto Sans Symbols"/>
+              <a:buChar char="▪"/>
+            </a:pPr>
+            <a:r>
+              <a:rPr lang="en-US" sz="2000" dirty="0">
+                <a:latin typeface="Roboto"/>
+                <a:ea typeface="Roboto"/>
+                <a:cs typeface="Roboto"/>
+                <a:sym typeface="Roboto"/>
+              </a:rPr>
+              <a:t> </a:t>
+            </a:r>
+            <a:r>
+              <a:rPr lang="ru-RU" sz="2000" dirty="0">
+                <a:latin typeface="Roboto"/>
+                <a:ea typeface="Roboto"/>
+                <a:cs typeface="Roboto"/>
+                <a:sym typeface="Roboto"/>
+              </a:rPr>
+              <a:t>Ссылочным ключом считается свойство, которое подпадает под следующие правила именования</a:t>
+            </a:r>
+            <a:r>
+              <a:rPr lang="en-US" sz="2000" dirty="0">
+                <a:latin typeface="Roboto"/>
+                <a:ea typeface="Roboto"/>
+                <a:cs typeface="Roboto"/>
+                <a:sym typeface="Roboto"/>
+              </a:rPr>
+              <a:t>:</a:t>
+            </a:r>
+          </a:p>
+          <a:p>
+            <a:pPr lvl="0" indent="-12700">
+              <a:spcBef>
+                <a:spcPts val="360"/>
+              </a:spcBef>
+              <a:buSzPts val="2000"/>
+              <a:buFont typeface="Noto Sans Symbols"/>
+              <a:buChar char="▪"/>
+            </a:pPr>
+            <a:endParaRPr lang="en-US" sz="2000" dirty="0">
+              <a:latin typeface="Roboto"/>
+              <a:ea typeface="Roboto"/>
+              <a:cs typeface="Roboto"/>
+              <a:sym typeface="Roboto"/>
+            </a:endParaRPr>
+          </a:p>
+          <a:p>
+            <a:pPr lvl="0">
+              <a:spcBef>
+                <a:spcPts val="360"/>
+              </a:spcBef>
+              <a:buSzPts val="2000"/>
+            </a:pPr>
+            <a:r>
+              <a:rPr lang="en-US" sz="2000" b="1" dirty="0">
+                <a:latin typeface="Roboto"/>
+                <a:ea typeface="Roboto"/>
+                <a:cs typeface="Roboto"/>
+                <a:sym typeface="Roboto"/>
+              </a:rPr>
+              <a:t>&lt;navigation property name&gt;&lt;principal key property name&gt;</a:t>
+            </a:r>
+          </a:p>
+          <a:p>
+            <a:pPr lvl="0">
+              <a:spcBef>
+                <a:spcPts val="360"/>
+              </a:spcBef>
+              <a:buSzPts val="2000"/>
+            </a:pPr>
+            <a:r>
+              <a:rPr lang="en-US" sz="2000" b="1" dirty="0">
+                <a:latin typeface="Roboto"/>
+                <a:ea typeface="Roboto"/>
+                <a:cs typeface="Roboto"/>
+                <a:sym typeface="Roboto"/>
+              </a:rPr>
+              <a:t>&lt;navigation property name&gt;Id</a:t>
+            </a:r>
+          </a:p>
+          <a:p>
+            <a:pPr lvl="0">
+              <a:spcBef>
+                <a:spcPts val="360"/>
+              </a:spcBef>
+              <a:buSzPts val="2000"/>
+            </a:pPr>
+            <a:r>
+              <a:rPr lang="en-US" sz="2000" b="1" dirty="0">
+                <a:latin typeface="Roboto"/>
+                <a:ea typeface="Roboto"/>
+                <a:cs typeface="Roboto"/>
+                <a:sym typeface="Roboto"/>
+              </a:rPr>
+              <a:t>&lt;principal entity name&gt;&lt;principal key property name&gt;</a:t>
+            </a:r>
+          </a:p>
+          <a:p>
+            <a:pPr lvl="0">
+              <a:spcBef>
+                <a:spcPts val="360"/>
+              </a:spcBef>
+              <a:buSzPts val="2000"/>
+            </a:pPr>
+            <a:r>
+              <a:rPr lang="en-US" sz="2000" b="1" dirty="0">
+                <a:latin typeface="Roboto"/>
+                <a:ea typeface="Roboto"/>
+                <a:cs typeface="Roboto"/>
+                <a:sym typeface="Roboto"/>
+              </a:rPr>
+              <a:t>&lt;principal entity name&gt;Id</a:t>
+            </a:r>
+            <a:endParaRPr sz="2000" b="1" i="0" u="none" strike="noStrike" cap="none" dirty="0">
+              <a:latin typeface="Roboto"/>
+              <a:ea typeface="Roboto"/>
+              <a:cs typeface="Roboto"/>
+              <a:sym typeface="Roboto"/>
+            </a:endParaRPr>
+          </a:p>
+        </p:txBody>
+      </p:sp>
+    </p:spTree>
+    <p:extLst>
+      <p:ext uri="{BB962C8B-B14F-4D97-AF65-F5344CB8AC3E}">
+        <p14:creationId xmlns:p14="http://schemas.microsoft.com/office/powerpoint/2010/main" val="650941755"/>
       </p:ext>
     </p:extLst>
   </p:cSld>

</xml_diff>

<commit_message>
Updated EF Core presentation
</commit_message>
<xml_diff>
--- a/8.EntityFramework/EntityFramework.pptx
+++ b/8.EntityFramework/EntityFramework.pptx
@@ -5,7 +5,7 @@
     <p:sldMasterId id="2147483661" r:id="rId1"/>
   </p:sldMasterIdLst>
   <p:notesMasterIdLst>
-    <p:notesMasterId r:id="rId13"/>
+    <p:notesMasterId r:id="rId14"/>
   </p:notesMasterIdLst>
   <p:sldIdLst>
     <p:sldId id="256" r:id="rId2"/>
@@ -18,24 +18,25 @@
     <p:sldId id="278" r:id="rId9"/>
     <p:sldId id="279" r:id="rId10"/>
     <p:sldId id="280" r:id="rId11"/>
-    <p:sldId id="275" r:id="rId12"/>
+    <p:sldId id="281" r:id="rId12"/>
+    <p:sldId id="282" r:id="rId13"/>
   </p:sldIdLst>
   <p:sldSz cx="9144000" cy="6858000" type="screen4x3"/>
   <p:notesSz cx="6858000" cy="9144000"/>
   <p:embeddedFontLst>
     <p:embeddedFont>
       <p:font typeface="Calibri" panose="020F0502020204030204" pitchFamily="34" charset="0"/>
-      <p:regular r:id="rId14"/>
-      <p:bold r:id="rId15"/>
-      <p:italic r:id="rId16"/>
-      <p:boldItalic r:id="rId17"/>
+      <p:regular r:id="rId15"/>
+      <p:bold r:id="rId16"/>
+      <p:italic r:id="rId17"/>
+      <p:boldItalic r:id="rId18"/>
     </p:embeddedFont>
     <p:embeddedFont>
       <p:font typeface="Roboto" panose="020B0604020202020204" charset="0"/>
-      <p:regular r:id="rId18"/>
-      <p:bold r:id="rId19"/>
-      <p:italic r:id="rId20"/>
-      <p:boldItalic r:id="rId21"/>
+      <p:regular r:id="rId19"/>
+      <p:bold r:id="rId20"/>
+      <p:italic r:id="rId21"/>
+      <p:boldItalic r:id="rId22"/>
     </p:embeddedFont>
   </p:embeddedFontLst>
   <p:defaultTextStyle>
@@ -1783,31 +1784,7 @@
               </a:spcAft>
               <a:buNone/>
             </a:pPr>
-            <a:r>
-              <a:rPr lang="ru-RU" sz="1200" b="0" i="0" u="none" strike="noStrike" cap="none" dirty="0">
-                <a:solidFill>
-                  <a:schemeClr val="dk1"/>
-                </a:solidFill>
-                <a:latin typeface="Calibri"/>
-                <a:ea typeface="Calibri"/>
-                <a:cs typeface="Calibri"/>
-                <a:sym typeface="Calibri"/>
-              </a:rPr>
-              <a:t>Переходим в код и рассматривает примеры с</a:t>
-            </a:r>
-            <a:r>
-              <a:rPr lang="en-US" sz="1200" b="0" i="0" u="none" strike="noStrike" cap="none" dirty="0">
-                <a:solidFill>
-                  <a:schemeClr val="dk1"/>
-                </a:solidFill>
-                <a:latin typeface="Calibri"/>
-                <a:ea typeface="Calibri"/>
-                <a:cs typeface="Calibri"/>
-                <a:sym typeface="Calibri"/>
-              </a:rPr>
-              <a:t> LINQ to SQL</a:t>
-            </a:r>
-            <a:endParaRPr sz="1200" b="0" i="0" u="none" strike="noStrike" cap="none" dirty="0">
+            <a:endParaRPr sz="1200" b="0" i="0" u="none" strike="noStrike" cap="none">
               <a:solidFill>
                 <a:schemeClr val="dk1"/>
               </a:solidFill>
@@ -1884,7 +1861,200 @@
     </p:spTree>
     <p:extLst>
       <p:ext uri="{BB962C8B-B14F-4D97-AF65-F5344CB8AC3E}">
-        <p14:creationId xmlns:p14="http://schemas.microsoft.com/office/powerpoint/2010/main" val="2807150285"/>
+        <p14:creationId xmlns:p14="http://schemas.microsoft.com/office/powerpoint/2010/main" val="388900469"/>
+      </p:ext>
+    </p:extLst>
+  </p:cSld>
+  <p:clrMapOvr>
+    <a:masterClrMapping/>
+  </p:clrMapOvr>
+</p:notes>
+</file>
+
+<file path=ppt/notesSlides/notesSlide12.xml><?xml version="1.0" encoding="utf-8"?>
+<p:notes xmlns:a="http://schemas.openxmlformats.org/drawingml/2006/main" xmlns:r="http://schemas.openxmlformats.org/officeDocument/2006/relationships" xmlns:p="http://schemas.openxmlformats.org/presentationml/2006/main" showMasterSp="0" showMasterPhAnim="0">
+  <p:cSld>
+    <p:spTree>
+      <p:nvGrpSpPr>
+        <p:cNvPr id="1" name="Shape 152"/>
+        <p:cNvGrpSpPr/>
+        <p:nvPr/>
+      </p:nvGrpSpPr>
+      <p:grpSpPr>
+        <a:xfrm>
+          <a:off x="0" y="0"/>
+          <a:ext cx="0" cy="0"/>
+          <a:chOff x="0" y="0"/>
+          <a:chExt cx="0" cy="0"/>
+        </a:xfrm>
+      </p:grpSpPr>
+      <p:sp>
+        <p:nvSpPr>
+          <p:cNvPr id="153" name="Shape 153"/>
+          <p:cNvSpPr>
+            <a:spLocks noGrp="1" noRot="1" noChangeAspect="1"/>
+          </p:cNvSpPr>
+          <p:nvPr>
+            <p:ph type="sldImg" idx="2"/>
+          </p:nvPr>
+        </p:nvSpPr>
+        <p:spPr>
+          <a:xfrm>
+            <a:off x="1143000" y="685800"/>
+            <a:ext cx="4572000" cy="3429000"/>
+          </a:xfrm>
+          <a:custGeom>
+            <a:avLst/>
+            <a:gdLst/>
+            <a:ahLst/>
+            <a:cxnLst/>
+            <a:rect l="0" t="0" r="0" b="0"/>
+            <a:pathLst>
+              <a:path w="120000" h="120000" extrusionOk="0">
+                <a:moveTo>
+                  <a:pt x="0" y="0"/>
+                </a:moveTo>
+                <a:lnTo>
+                  <a:pt x="120000" y="0"/>
+                </a:lnTo>
+                <a:lnTo>
+                  <a:pt x="120000" y="120000"/>
+                </a:lnTo>
+                <a:lnTo>
+                  <a:pt x="0" y="120000"/>
+                </a:lnTo>
+                <a:close/>
+              </a:path>
+            </a:pathLst>
+          </a:custGeom>
+          <a:noFill/>
+          <a:ln w="9525" cap="flat" cmpd="sng">
+            <a:solidFill>
+              <a:srgbClr val="000000"/>
+            </a:solidFill>
+            <a:prstDash val="solid"/>
+            <a:miter lim="800000"/>
+            <a:headEnd type="none" w="med" len="med"/>
+            <a:tailEnd type="none" w="med" len="med"/>
+          </a:ln>
+        </p:spPr>
+      </p:sp>
+      <p:sp>
+        <p:nvSpPr>
+          <p:cNvPr id="154" name="Shape 154"/>
+          <p:cNvSpPr txBox="1">
+            <a:spLocks noGrp="1"/>
+          </p:cNvSpPr>
+          <p:nvPr>
+            <p:ph type="body" idx="1"/>
+          </p:nvPr>
+        </p:nvSpPr>
+        <p:spPr>
+          <a:xfrm>
+            <a:off x="685800" y="4343400"/>
+            <a:ext cx="5486400" cy="4114800"/>
+          </a:xfrm>
+          <a:prstGeom prst="rect">
+            <a:avLst/>
+          </a:prstGeom>
+          <a:noFill/>
+          <a:ln>
+            <a:noFill/>
+          </a:ln>
+        </p:spPr>
+        <p:txBody>
+          <a:bodyPr spcFirstLastPara="1" wrap="square" lIns="91425" tIns="45700" rIns="91425" bIns="45700" anchor="t" anchorCtr="0">
+            <a:noAutofit/>
+          </a:bodyPr>
+          <a:lstStyle/>
+          <a:p>
+            <a:pPr marL="0" marR="0" lvl="0" indent="0" algn="l" rtl="0">
+              <a:spcBef>
+                <a:spcPts val="0"/>
+              </a:spcBef>
+              <a:spcAft>
+                <a:spcPts val="0"/>
+              </a:spcAft>
+              <a:buNone/>
+            </a:pPr>
+            <a:endParaRPr sz="1200" b="0" i="0" u="none" strike="noStrike" cap="none">
+              <a:solidFill>
+                <a:schemeClr val="dk1"/>
+              </a:solidFill>
+              <a:latin typeface="Calibri"/>
+              <a:ea typeface="Calibri"/>
+              <a:cs typeface="Calibri"/>
+              <a:sym typeface="Calibri"/>
+            </a:endParaRPr>
+          </a:p>
+        </p:txBody>
+      </p:sp>
+      <p:sp>
+        <p:nvSpPr>
+          <p:cNvPr id="155" name="Shape 155"/>
+          <p:cNvSpPr txBox="1">
+            <a:spLocks noGrp="1"/>
+          </p:cNvSpPr>
+          <p:nvPr>
+            <p:ph type="sldNum" idx="12"/>
+          </p:nvPr>
+        </p:nvSpPr>
+        <p:spPr>
+          <a:xfrm>
+            <a:off x="3884613" y="8685213"/>
+            <a:ext cx="2971800" cy="457200"/>
+          </a:xfrm>
+          <a:prstGeom prst="rect">
+            <a:avLst/>
+          </a:prstGeom>
+          <a:noFill/>
+          <a:ln>
+            <a:noFill/>
+          </a:ln>
+        </p:spPr>
+        <p:txBody>
+          <a:bodyPr spcFirstLastPara="1" wrap="square" lIns="91425" tIns="45700" rIns="91425" bIns="45700" anchor="b" anchorCtr="0">
+            <a:noAutofit/>
+          </a:bodyPr>
+          <a:lstStyle/>
+          <a:p>
+            <a:pPr marL="0" marR="0" lvl="0" indent="0" algn="r" rtl="0">
+              <a:spcBef>
+                <a:spcPts val="0"/>
+              </a:spcBef>
+              <a:spcAft>
+                <a:spcPts val="0"/>
+              </a:spcAft>
+              <a:buNone/>
+            </a:pPr>
+            <a:fld id="{00000000-1234-1234-1234-123412341234}" type="slidenum">
+              <a:rPr lang="en-US" sz="1200" b="0" i="0" u="none" strike="noStrike" cap="none">
+                <a:solidFill>
+                  <a:schemeClr val="dk1"/>
+                </a:solidFill>
+                <a:latin typeface="Calibri"/>
+                <a:ea typeface="Calibri"/>
+                <a:cs typeface="Calibri"/>
+                <a:sym typeface="Calibri"/>
+              </a:rPr>
+              <a:t>12</a:t>
+            </a:fld>
+            <a:endParaRPr sz="1200" b="0" i="0" u="none" strike="noStrike" cap="none">
+              <a:solidFill>
+                <a:schemeClr val="dk1"/>
+              </a:solidFill>
+              <a:latin typeface="Calibri"/>
+              <a:ea typeface="Calibri"/>
+              <a:cs typeface="Calibri"/>
+              <a:sym typeface="Calibri"/>
+            </a:endParaRPr>
+          </a:p>
+        </p:txBody>
+      </p:sp>
+    </p:spTree>
+    <p:extLst>
+      <p:ext uri="{BB962C8B-B14F-4D97-AF65-F5344CB8AC3E}">
+        <p14:creationId xmlns:p14="http://schemas.microsoft.com/office/powerpoint/2010/main" val="2450187445"/>
       </p:ext>
     </p:extLst>
   </p:cSld>
@@ -19162,7 +19332,7 @@
         </p:nvSpPr>
         <p:spPr>
           <a:xfrm>
-            <a:off x="443176" y="1370975"/>
+            <a:off x="457200" y="1493126"/>
             <a:ext cx="8229600" cy="1143000"/>
           </a:xfrm>
           <a:prstGeom prst="rect">
@@ -19203,19 +19373,7 @@
                 <a:cs typeface="Roboto"/>
                 <a:sym typeface="Roboto"/>
               </a:rPr>
-              <a:t> </a:t>
-            </a:r>
-            <a:r>
-              <a:rPr lang="en-US" sz="4100" b="1" dirty="0">
-                <a:solidFill>
-                  <a:srgbClr val="262626"/>
-                </a:solidFill>
-                <a:latin typeface="Roboto"/>
-                <a:ea typeface="Roboto"/>
-                <a:cs typeface="Roboto"/>
-                <a:sym typeface="Roboto"/>
-              </a:rPr>
-              <a:t>LINQ to SQL</a:t>
+              <a:t>Основные аттрибуты аннотации данных</a:t>
             </a:r>
             <a:endParaRPr sz="4100" b="1" i="0" u="none" strike="noStrike" cap="none" dirty="0">
               <a:solidFill>
@@ -19414,8 +19572,8 @@
         </p:nvSpPr>
         <p:spPr>
           <a:xfrm>
-            <a:off x="443176" y="2513975"/>
-            <a:ext cx="8181300" cy="3853874"/>
+            <a:off x="353700" y="2959101"/>
+            <a:ext cx="8475974" cy="2918148"/>
           </a:xfrm>
           <a:prstGeom prst="rect">
             <a:avLst/>
@@ -19431,175 +19589,839 @@
           </a:bodyPr>
           <a:lstStyle/>
           <a:p>
-            <a:pPr lvl="0" indent="-12700">
-              <a:spcAft>
-                <a:spcPts val="1200"/>
+            <a:pPr marL="0" marR="0" lvl="0" indent="-12700" algn="l" rtl="0">
+              <a:lnSpc>
+                <a:spcPct val="200000"/>
+              </a:lnSpc>
+              <a:spcBef>
+                <a:spcPts val="0"/>
+              </a:spcBef>
+              <a:spcAft>
+                <a:spcPts val="0"/>
               </a:spcAft>
               <a:buSzPts val="2000"/>
               <a:buFont typeface="Noto Sans Symbols"/>
               <a:buChar char="▪"/>
             </a:pPr>
             <a:r>
-              <a:rPr lang="ru-RU" sz="2000" b="1" dirty="0">
-                <a:solidFill>
-                  <a:srgbClr val="262626"/>
-                </a:solidFill>
+              <a:rPr lang="en-US" sz="1800" dirty="0">
                 <a:latin typeface="Roboto"/>
                 <a:ea typeface="Roboto"/>
-                <a:cs typeface="Roboto"/>
+                <a:sym typeface="Calibri"/>
+              </a:rPr>
+              <a:t> </a:t>
+            </a:r>
+            <a:r>
+              <a:rPr lang="en-US" sz="1800" b="1" dirty="0">
+                <a:latin typeface="Roboto"/>
+                <a:ea typeface="Roboto"/>
+                <a:sym typeface="Roboto"/>
+              </a:rPr>
+              <a:t>[Table(“</a:t>
+            </a:r>
+            <a:r>
+              <a:rPr lang="en-US" sz="1800" b="1" dirty="0" err="1">
+                <a:latin typeface="Roboto"/>
+                <a:ea typeface="Roboto"/>
+                <a:sym typeface="Roboto"/>
+              </a:rPr>
+              <a:t>table_name</a:t>
+            </a:r>
+            <a:r>
+              <a:rPr lang="en-US" sz="1800" b="1" dirty="0">
+                <a:latin typeface="Roboto"/>
+                <a:ea typeface="Roboto"/>
+                <a:sym typeface="Roboto"/>
+              </a:rPr>
+              <a:t>”)] </a:t>
+            </a:r>
+            <a:r>
+              <a:rPr lang="en-US" sz="1800" dirty="0">
+                <a:latin typeface="Roboto"/>
+                <a:ea typeface="Roboto"/>
+                <a:sym typeface="Roboto"/>
+              </a:rPr>
+              <a:t>– </a:t>
+            </a:r>
+            <a:r>
+              <a:rPr lang="ru-RU" sz="1800" dirty="0">
+                <a:latin typeface="Roboto"/>
+                <a:ea typeface="Roboto"/>
+                <a:sym typeface="Roboto"/>
+              </a:rPr>
+              <a:t>Указание имени таблицы для сущности</a:t>
+            </a:r>
+          </a:p>
+          <a:p>
+            <a:pPr marL="0" marR="0" lvl="0" indent="-12700" algn="l" rtl="0">
+              <a:lnSpc>
+                <a:spcPct val="200000"/>
+              </a:lnSpc>
+              <a:spcBef>
+                <a:spcPts val="0"/>
+              </a:spcBef>
+              <a:spcAft>
+                <a:spcPts val="0"/>
+              </a:spcAft>
+              <a:buSzPts val="2000"/>
+              <a:buFont typeface="Noto Sans Symbols"/>
+              <a:buChar char="▪"/>
+            </a:pPr>
+            <a:r>
+              <a:rPr lang="ru-RU" sz="1800" dirty="0">
+                <a:latin typeface="Roboto"/>
+                <a:ea typeface="Roboto"/>
                 <a:sym typeface="Roboto"/>
               </a:rPr>
               <a:t> </a:t>
             </a:r>
             <a:r>
-              <a:rPr lang="en-US" sz="2000" b="1" dirty="0">
-                <a:solidFill>
-                  <a:srgbClr val="262626"/>
-                </a:solidFill>
+              <a:rPr lang="en-US" sz="1800" b="1" dirty="0">
                 <a:latin typeface="Roboto"/>
                 <a:ea typeface="Roboto"/>
-                <a:cs typeface="Roboto"/>
                 <a:sym typeface="Roboto"/>
               </a:rPr>
-              <a:t>LINQ to SQL </a:t>
+              <a:t>[Column(“</a:t>
             </a:r>
             <a:r>
-              <a:rPr lang="ru-RU" sz="2000" dirty="0">
-                <a:solidFill>
-                  <a:srgbClr val="262626"/>
-                </a:solidFill>
+              <a:rPr lang="en-US" sz="1800" b="1" dirty="0" err="1">
                 <a:latin typeface="Roboto"/>
                 <a:ea typeface="Roboto"/>
-                <a:cs typeface="Roboto"/>
                 <a:sym typeface="Roboto"/>
               </a:rPr>
-              <a:t>– это компонент </a:t>
+              <a:t>column_name</a:t>
             </a:r>
             <a:r>
-              <a:rPr lang="en-US" sz="2000" dirty="0">
-                <a:solidFill>
-                  <a:srgbClr val="262626"/>
-                </a:solidFill>
+              <a:rPr lang="en-US" sz="1800" b="1" dirty="0">
                 <a:latin typeface="Roboto"/>
                 <a:ea typeface="Roboto"/>
-                <a:cs typeface="Roboto"/>
                 <a:sym typeface="Roboto"/>
               </a:rPr>
-              <a:t>.NET Framework</a:t>
+              <a:t>”)]</a:t>
             </a:r>
             <a:r>
-              <a:rPr lang="ru-RU" sz="2000" dirty="0">
-                <a:solidFill>
-                  <a:srgbClr val="262626"/>
-                </a:solidFill>
+              <a:rPr lang="en-US" sz="1800" dirty="0">
                 <a:latin typeface="Roboto"/>
                 <a:ea typeface="Roboto"/>
-                <a:cs typeface="Roboto"/>
                 <a:sym typeface="Roboto"/>
               </a:rPr>
-              <a:t>, который позволяет работать с реляционными структурами как с обьектами. </a:t>
+              <a:t> </a:t>
+            </a:r>
+            <a:r>
+              <a:rPr lang="ru-RU" sz="1800" dirty="0">
+                <a:latin typeface="Roboto"/>
+                <a:ea typeface="Roboto"/>
+                <a:sym typeface="Roboto"/>
+              </a:rPr>
+              <a:t>–Указание имени поля для свойства</a:t>
             </a:r>
           </a:p>
           <a:p>
-            <a:pPr lvl="0" indent="-12700">
-              <a:spcAft>
-                <a:spcPts val="1200"/>
+            <a:pPr marL="0" marR="0" lvl="0" indent="-12700" algn="l" rtl="0">
+              <a:lnSpc>
+                <a:spcPct val="200000"/>
+              </a:lnSpc>
+              <a:spcBef>
+                <a:spcPts val="0"/>
+              </a:spcBef>
+              <a:spcAft>
+                <a:spcPts val="0"/>
               </a:spcAft>
               <a:buSzPts val="2000"/>
               <a:buFont typeface="Noto Sans Symbols"/>
               <a:buChar char="▪"/>
             </a:pPr>
             <a:r>
-              <a:rPr lang="ru-RU" sz="2000" dirty="0">
-                <a:solidFill>
-                  <a:srgbClr val="262626"/>
-                </a:solidFill>
+              <a:rPr lang="ru-RU" sz="1800" b="1" dirty="0">
                 <a:latin typeface="Roboto"/>
                 <a:ea typeface="Roboto"/>
-                <a:cs typeface="Roboto"/>
                 <a:sym typeface="Roboto"/>
               </a:rPr>
-              <a:t> Простыми словами: вы выполняете запрос используя</a:t>
+              <a:t> </a:t>
             </a:r>
             <a:r>
-              <a:rPr lang="en-US" sz="2000" dirty="0">
-                <a:solidFill>
-                  <a:srgbClr val="262626"/>
-                </a:solidFill>
+              <a:rPr lang="en-US" sz="1800" b="1" dirty="0">
                 <a:latin typeface="Roboto"/>
                 <a:ea typeface="Roboto"/>
-                <a:cs typeface="Roboto"/>
                 <a:sym typeface="Roboto"/>
               </a:rPr>
-              <a:t> LINQ</a:t>
+              <a:t>[</a:t>
             </a:r>
             <a:r>
-              <a:rPr lang="ru-RU" sz="2000" dirty="0">
-                <a:solidFill>
-                  <a:srgbClr val="262626"/>
-                </a:solidFill>
+              <a:rPr lang="en-US" sz="1800" b="1" dirty="0" err="1">
                 <a:latin typeface="Roboto"/>
                 <a:ea typeface="Roboto"/>
-                <a:cs typeface="Roboto"/>
                 <a:sym typeface="Roboto"/>
               </a:rPr>
-              <a:t>, </a:t>
+              <a:t>ForeignKey</a:t>
             </a:r>
             <a:r>
-              <a:rPr lang="en-US" sz="2000" dirty="0">
-                <a:solidFill>
-                  <a:srgbClr val="262626"/>
-                </a:solidFill>
+              <a:rPr lang="en-US" sz="1800" b="1" dirty="0">
                 <a:latin typeface="Roboto"/>
                 <a:ea typeface="Roboto"/>
-                <a:cs typeface="Roboto"/>
                 <a:sym typeface="Roboto"/>
               </a:rPr>
-              <a:t>LINQ to SQL</a:t>
+              <a:t>(“</a:t>
             </a:r>
             <a:r>
-              <a:rPr lang="ru-RU" sz="2000" dirty="0">
-                <a:solidFill>
-                  <a:srgbClr val="262626"/>
-                </a:solidFill>
+              <a:rPr lang="en-US" sz="1800" b="1" dirty="0" err="1">
                 <a:latin typeface="Roboto"/>
                 <a:ea typeface="Roboto"/>
-                <a:cs typeface="Roboto"/>
                 <a:sym typeface="Roboto"/>
               </a:rPr>
-              <a:t>, трансирует этот запрос в базу данных в виде </a:t>
+              <a:t>key_name</a:t>
             </a:r>
             <a:r>
-              <a:rPr lang="en-US" sz="2000" dirty="0">
-                <a:solidFill>
-                  <a:srgbClr val="262626"/>
-                </a:solidFill>
+              <a:rPr lang="en-US" sz="1800" b="1" dirty="0">
                 <a:latin typeface="Roboto"/>
                 <a:ea typeface="Roboto"/>
-                <a:cs typeface="Roboto"/>
                 <a:sym typeface="Roboto"/>
               </a:rPr>
-              <a:t>SQL </a:t>
+              <a:t>”)] </a:t>
             </a:r>
             <a:r>
-              <a:rPr lang="ru-RU" sz="2000" dirty="0">
-                <a:solidFill>
-                  <a:srgbClr val="262626"/>
-                </a:solidFill>
+              <a:rPr lang="en-US" sz="1800" dirty="0">
                 <a:latin typeface="Roboto"/>
                 <a:ea typeface="Roboto"/>
-                <a:cs typeface="Roboto"/>
                 <a:sym typeface="Roboto"/>
               </a:rPr>
-              <a:t>запроса.</a:t>
+              <a:t>–</a:t>
             </a:r>
+            <a:r>
+              <a:rPr lang="ru-RU" sz="1800" dirty="0">
+                <a:latin typeface="Roboto"/>
+                <a:ea typeface="Roboto"/>
+                <a:sym typeface="Roboto"/>
+              </a:rPr>
+              <a:t>Определение ссылочного ключа</a:t>
+            </a:r>
+          </a:p>
+          <a:p>
+            <a:pPr marL="0" marR="0" lvl="0" indent="-12700" algn="l" rtl="0">
+              <a:lnSpc>
+                <a:spcPct val="200000"/>
+              </a:lnSpc>
+              <a:spcBef>
+                <a:spcPts val="0"/>
+              </a:spcBef>
+              <a:spcAft>
+                <a:spcPts val="0"/>
+              </a:spcAft>
+              <a:buSzPts val="2000"/>
+              <a:buFont typeface="Noto Sans Symbols"/>
+              <a:buChar char="▪"/>
+            </a:pPr>
+            <a:endParaRPr lang="ru-RU" sz="1800" dirty="0">
+              <a:latin typeface="Roboto"/>
+              <a:ea typeface="Roboto"/>
+              <a:sym typeface="Roboto"/>
+            </a:endParaRPr>
+          </a:p>
+          <a:p>
+            <a:pPr marL="0" marR="0" lvl="0" indent="-12700" algn="l" rtl="0">
+              <a:lnSpc>
+                <a:spcPct val="200000"/>
+              </a:lnSpc>
+              <a:spcBef>
+                <a:spcPts val="0"/>
+              </a:spcBef>
+              <a:spcAft>
+                <a:spcPts val="0"/>
+              </a:spcAft>
+              <a:buSzPts val="2000"/>
+              <a:buFont typeface="Noto Sans Symbols"/>
+              <a:buChar char="▪"/>
+            </a:pPr>
+            <a:r>
+              <a:rPr lang="ru-RU" sz="1800" dirty="0">
+                <a:latin typeface="Roboto"/>
+                <a:ea typeface="Roboto"/>
+                <a:sym typeface="Roboto"/>
+              </a:rPr>
+              <a:t> </a:t>
+            </a:r>
+            <a:r>
+              <a:rPr lang="en-US" sz="1800" b="1" dirty="0">
+                <a:latin typeface="Roboto"/>
+                <a:ea typeface="Roboto"/>
+                <a:sym typeface="Roboto"/>
+              </a:rPr>
+              <a:t>[Key] </a:t>
+            </a:r>
+            <a:r>
+              <a:rPr lang="en-US" sz="1800" dirty="0">
+                <a:latin typeface="Roboto"/>
+                <a:ea typeface="Roboto"/>
+                <a:sym typeface="Roboto"/>
+              </a:rPr>
+              <a:t>–</a:t>
+            </a:r>
+            <a:r>
+              <a:rPr lang="ru-RU" sz="1800" dirty="0">
+                <a:latin typeface="Roboto"/>
+                <a:ea typeface="Roboto"/>
+                <a:sym typeface="Roboto"/>
+              </a:rPr>
+              <a:t> Определение первичного ключа</a:t>
+            </a:r>
+          </a:p>
+          <a:p>
+            <a:pPr marL="0" marR="0" lvl="0" indent="-12700" algn="l" rtl="0">
+              <a:lnSpc>
+                <a:spcPct val="200000"/>
+              </a:lnSpc>
+              <a:spcBef>
+                <a:spcPts val="0"/>
+              </a:spcBef>
+              <a:spcAft>
+                <a:spcPts val="0"/>
+              </a:spcAft>
+              <a:buSzPts val="2000"/>
+              <a:buFont typeface="Noto Sans Symbols"/>
+              <a:buChar char="▪"/>
+            </a:pPr>
+            <a:r>
+              <a:rPr lang="ru-RU" sz="1800" dirty="0">
+                <a:latin typeface="Roboto"/>
+                <a:ea typeface="Roboto"/>
+                <a:sym typeface="Roboto"/>
+              </a:rPr>
+              <a:t> </a:t>
+            </a:r>
+            <a:r>
+              <a:rPr lang="en-US" sz="1800" b="1" dirty="0">
+                <a:latin typeface="Roboto"/>
+                <a:ea typeface="Roboto"/>
+                <a:sym typeface="Roboto"/>
+              </a:rPr>
+              <a:t>[Required] </a:t>
+            </a:r>
+            <a:r>
+              <a:rPr lang="en-US" sz="1800" dirty="0">
+                <a:latin typeface="Roboto"/>
+                <a:ea typeface="Roboto"/>
+                <a:sym typeface="Roboto"/>
+              </a:rPr>
+              <a:t>– </a:t>
+            </a:r>
+            <a:r>
+              <a:rPr lang="ru-RU" sz="1800" dirty="0">
+                <a:latin typeface="Roboto"/>
+                <a:ea typeface="Roboto"/>
+                <a:sym typeface="Roboto"/>
+              </a:rPr>
+              <a:t>Указывает что поле в БД </a:t>
+            </a:r>
+            <a:r>
+              <a:rPr lang="en-US" sz="1800" dirty="0">
+                <a:latin typeface="Roboto"/>
+                <a:ea typeface="Roboto"/>
+                <a:sym typeface="Roboto"/>
+              </a:rPr>
+              <a:t>not null</a:t>
+            </a:r>
+            <a:endParaRPr sz="1800" i="0" u="none" strike="noStrike" cap="none" dirty="0">
+              <a:latin typeface="Roboto"/>
+              <a:ea typeface="Roboto"/>
+              <a:cs typeface="Roboto"/>
+              <a:sym typeface="Roboto"/>
+            </a:endParaRPr>
           </a:p>
         </p:txBody>
       </p:sp>
     </p:spTree>
     <p:extLst>
       <p:ext uri="{BB962C8B-B14F-4D97-AF65-F5344CB8AC3E}">
-        <p14:creationId xmlns:p14="http://schemas.microsoft.com/office/powerpoint/2010/main" val="901432929"/>
+        <p14:creationId xmlns:p14="http://schemas.microsoft.com/office/powerpoint/2010/main" val="1141694278"/>
+      </p:ext>
+    </p:extLst>
+  </p:cSld>
+  <p:clrMapOvr>
+    <a:masterClrMapping/>
+  </p:clrMapOvr>
+  <p:transition>
+    <p:fade/>
+  </p:transition>
+</p:sld>
+</file>
+
+<file path=ppt/slides/slide12.xml><?xml version="1.0" encoding="utf-8"?>
+<p:sld xmlns:a="http://schemas.openxmlformats.org/drawingml/2006/main" xmlns:r="http://schemas.openxmlformats.org/officeDocument/2006/relationships" xmlns:p="http://schemas.openxmlformats.org/presentationml/2006/main">
+  <p:cSld>
+    <p:spTree>
+      <p:nvGrpSpPr>
+        <p:cNvPr id="1" name="Shape 156"/>
+        <p:cNvGrpSpPr/>
+        <p:nvPr/>
+      </p:nvGrpSpPr>
+      <p:grpSpPr>
+        <a:xfrm>
+          <a:off x="0" y="0"/>
+          <a:ext cx="0" cy="0"/>
+          <a:chOff x="0" y="0"/>
+          <a:chExt cx="0" cy="0"/>
+        </a:xfrm>
+      </p:grpSpPr>
+      <p:sp>
+        <p:nvSpPr>
+          <p:cNvPr id="158" name="Shape 158"/>
+          <p:cNvSpPr txBox="1">
+            <a:spLocks noGrp="1"/>
+          </p:cNvSpPr>
+          <p:nvPr>
+            <p:ph type="title"/>
+          </p:nvPr>
+        </p:nvSpPr>
+        <p:spPr>
+          <a:xfrm>
+            <a:off x="457200" y="1493126"/>
+            <a:ext cx="8229600" cy="1143000"/>
+          </a:xfrm>
+          <a:prstGeom prst="rect">
+            <a:avLst/>
+          </a:prstGeom>
+          <a:noFill/>
+          <a:ln>
+            <a:noFill/>
+          </a:ln>
+        </p:spPr>
+        <p:txBody>
+          <a:bodyPr spcFirstLastPara="1" wrap="square" lIns="91425" tIns="45700" rIns="91425" bIns="45700" anchor="ctr" anchorCtr="0">
+            <a:noAutofit/>
+          </a:bodyPr>
+          <a:lstStyle/>
+          <a:p>
+            <a:pPr marL="0" marR="0" lvl="0" indent="0" algn="l" rtl="0">
+              <a:spcBef>
+                <a:spcPts val="0"/>
+              </a:spcBef>
+              <a:spcAft>
+                <a:spcPts val="0"/>
+              </a:spcAft>
+              <a:buClr>
+                <a:schemeClr val="dk1"/>
+              </a:buClr>
+              <a:buSzPts val="4400"/>
+              <a:buFont typeface="Calibri"/>
+              <a:buNone/>
+            </a:pPr>
+            <a:r>
+              <a:rPr lang="en-US" sz="4100" b="1" dirty="0">
+                <a:solidFill>
+                  <a:srgbClr val="262626"/>
+                </a:solidFill>
+                <a:latin typeface="Roboto"/>
+                <a:ea typeface="Roboto"/>
+                <a:cs typeface="Roboto"/>
+                <a:sym typeface="Roboto"/>
+              </a:rPr>
+              <a:t>Fluent API </a:t>
+            </a:r>
+            <a:r>
+              <a:rPr lang="ru-RU" sz="4100" b="1" dirty="0">
+                <a:solidFill>
+                  <a:srgbClr val="262626"/>
+                </a:solidFill>
+                <a:latin typeface="Roboto"/>
+                <a:ea typeface="Roboto"/>
+                <a:cs typeface="Roboto"/>
+                <a:sym typeface="Roboto"/>
+              </a:rPr>
+              <a:t>в </a:t>
+            </a:r>
+            <a:r>
+              <a:rPr lang="en-US" sz="4100" b="1" dirty="0">
+                <a:solidFill>
+                  <a:srgbClr val="262626"/>
+                </a:solidFill>
+                <a:latin typeface="Roboto"/>
+                <a:ea typeface="Roboto"/>
+                <a:cs typeface="Roboto"/>
+                <a:sym typeface="Roboto"/>
+              </a:rPr>
+              <a:t>EF Core</a:t>
+            </a:r>
+            <a:endParaRPr sz="4100" b="1" i="0" u="none" strike="noStrike" cap="none" dirty="0">
+              <a:solidFill>
+                <a:srgbClr val="262626"/>
+              </a:solidFill>
+              <a:latin typeface="Roboto"/>
+              <a:ea typeface="Roboto"/>
+              <a:cs typeface="Roboto"/>
+              <a:sym typeface="Roboto"/>
+            </a:endParaRPr>
+          </a:p>
+        </p:txBody>
+      </p:sp>
+      <p:sp>
+        <p:nvSpPr>
+          <p:cNvPr id="159" name="Shape 159"/>
+          <p:cNvSpPr/>
+          <p:nvPr/>
+        </p:nvSpPr>
+        <p:spPr>
+          <a:xfrm>
+            <a:off x="7145316" y="408237"/>
+            <a:ext cx="1856100" cy="290400"/>
+          </a:xfrm>
+          <a:prstGeom prst="roundRect">
+            <a:avLst>
+              <a:gd name="adj" fmla="val 0"/>
+            </a:avLst>
+          </a:prstGeom>
+          <a:noFill/>
+          <a:ln>
+            <a:noFill/>
+          </a:ln>
+        </p:spPr>
+        <p:txBody>
+          <a:bodyPr spcFirstLastPara="1" wrap="square" lIns="91425" tIns="45700" rIns="91425" bIns="45700" anchor="ctr" anchorCtr="0">
+            <a:noAutofit/>
+          </a:bodyPr>
+          <a:lstStyle/>
+          <a:p>
+            <a:pPr marL="0" marR="0" lvl="0" indent="0" algn="ctr" rtl="0">
+              <a:spcBef>
+                <a:spcPts val="0"/>
+              </a:spcBef>
+              <a:spcAft>
+                <a:spcPts val="0"/>
+              </a:spcAft>
+              <a:buClr>
+                <a:schemeClr val="lt1"/>
+              </a:buClr>
+              <a:buSzPts val="1200"/>
+              <a:buFont typeface="Arial"/>
+              <a:buNone/>
+            </a:pPr>
+            <a:r>
+              <a:rPr lang="en-US" sz="1500" b="1" i="0" strike="noStrike" cap="none">
+                <a:solidFill>
+                  <a:srgbClr val="262626"/>
+                </a:solidFill>
+                <a:latin typeface="Roboto"/>
+                <a:ea typeface="Roboto"/>
+                <a:cs typeface="Roboto"/>
+                <a:sym typeface="Roboto"/>
+              </a:rPr>
+              <a:t>www.itea.ua</a:t>
+            </a:r>
+            <a:endParaRPr sz="1500" b="1" i="0" strike="noStrike" cap="none">
+              <a:solidFill>
+                <a:srgbClr val="262626"/>
+              </a:solidFill>
+              <a:latin typeface="Roboto"/>
+              <a:ea typeface="Roboto"/>
+              <a:cs typeface="Roboto"/>
+              <a:sym typeface="Roboto"/>
+            </a:endParaRPr>
+          </a:p>
+        </p:txBody>
+      </p:sp>
+      <p:sp>
+        <p:nvSpPr>
+          <p:cNvPr id="160" name="Shape 160"/>
+          <p:cNvSpPr/>
+          <p:nvPr/>
+        </p:nvSpPr>
+        <p:spPr>
+          <a:xfrm rot="10800000" flipH="1">
+            <a:off x="0" y="1127850"/>
+            <a:ext cx="3143100" cy="42300"/>
+          </a:xfrm>
+          <a:prstGeom prst="rect">
+            <a:avLst/>
+          </a:prstGeom>
+          <a:solidFill>
+            <a:srgbClr val="CC0000"/>
+          </a:solidFill>
+          <a:ln>
+            <a:noFill/>
+          </a:ln>
+        </p:spPr>
+        <p:txBody>
+          <a:bodyPr spcFirstLastPara="1" wrap="square" lIns="91425" tIns="91425" rIns="91425" bIns="91425" anchor="ctr" anchorCtr="0">
+            <a:noAutofit/>
+          </a:bodyPr>
+          <a:lstStyle/>
+          <a:p>
+            <a:pPr marL="0" lvl="0" indent="0">
+              <a:spcBef>
+                <a:spcPts val="0"/>
+              </a:spcBef>
+              <a:spcAft>
+                <a:spcPts val="0"/>
+              </a:spcAft>
+              <a:buNone/>
+            </a:pPr>
+            <a:r>
+              <a:rPr lang="en-US"/>
+              <a:t>                                                                                     </a:t>
+            </a:r>
+            <a:endParaRPr/>
+          </a:p>
+        </p:txBody>
+      </p:sp>
+      <p:sp>
+        <p:nvSpPr>
+          <p:cNvPr id="161" name="Shape 161"/>
+          <p:cNvSpPr/>
+          <p:nvPr/>
+        </p:nvSpPr>
+        <p:spPr>
+          <a:xfrm rot="10800000" flipH="1">
+            <a:off x="3067050" y="1127850"/>
+            <a:ext cx="3143100" cy="42300"/>
+          </a:xfrm>
+          <a:prstGeom prst="rect">
+            <a:avLst/>
+          </a:prstGeom>
+          <a:solidFill>
+            <a:srgbClr val="262626"/>
+          </a:solidFill>
+          <a:ln>
+            <a:noFill/>
+          </a:ln>
+        </p:spPr>
+        <p:txBody>
+          <a:bodyPr spcFirstLastPara="1" wrap="square" lIns="91425" tIns="91425" rIns="91425" bIns="91425" anchor="ctr" anchorCtr="0">
+            <a:noAutofit/>
+          </a:bodyPr>
+          <a:lstStyle/>
+          <a:p>
+            <a:pPr marL="0" lvl="0" indent="0">
+              <a:spcBef>
+                <a:spcPts val="0"/>
+              </a:spcBef>
+              <a:spcAft>
+                <a:spcPts val="0"/>
+              </a:spcAft>
+              <a:buNone/>
+            </a:pPr>
+            <a:endParaRPr/>
+          </a:p>
+        </p:txBody>
+      </p:sp>
+      <p:pic>
+        <p:nvPicPr>
+          <p:cNvPr id="162" name="Shape 162"/>
+          <p:cNvPicPr preferRelativeResize="0"/>
+          <p:nvPr/>
+        </p:nvPicPr>
+        <p:blipFill>
+          <a:blip r:embed="rId3">
+            <a:alphaModFix/>
+          </a:blip>
+          <a:stretch>
+            <a:fillRect/>
+          </a:stretch>
+        </p:blipFill>
+        <p:spPr>
+          <a:xfrm>
+            <a:off x="353700" y="302000"/>
+            <a:ext cx="1741800" cy="502875"/>
+          </a:xfrm>
+          <a:prstGeom prst="rect">
+            <a:avLst/>
+          </a:prstGeom>
+          <a:noFill/>
+          <a:ln>
+            <a:noFill/>
+          </a:ln>
+        </p:spPr>
+      </p:pic>
+      <p:sp>
+        <p:nvSpPr>
+          <p:cNvPr id="9" name="Shape 163">
+            <a:extLst>
+              <a:ext uri="{FF2B5EF4-FFF2-40B4-BE49-F238E27FC236}">
+                <a16:creationId xmlns:a16="http://schemas.microsoft.com/office/drawing/2014/main" id="{E6CF8CC7-A36B-4B46-BBD1-37B8F800965D}"/>
+              </a:ext>
+            </a:extLst>
+          </p:cNvPr>
+          <p:cNvSpPr txBox="1"/>
+          <p:nvPr/>
+        </p:nvSpPr>
+        <p:spPr>
+          <a:xfrm>
+            <a:off x="457200" y="2568374"/>
+            <a:ext cx="8181300" cy="3074100"/>
+          </a:xfrm>
+          <a:prstGeom prst="rect">
+            <a:avLst/>
+          </a:prstGeom>
+          <a:noFill/>
+          <a:ln>
+            <a:noFill/>
+          </a:ln>
+        </p:spPr>
+        <p:txBody>
+          <a:bodyPr spcFirstLastPara="1" wrap="square" lIns="91425" tIns="45700" rIns="91425" bIns="45700" anchor="ctr" anchorCtr="0">
+            <a:noAutofit/>
+          </a:bodyPr>
+          <a:lstStyle/>
+          <a:p>
+            <a:pPr lvl="0">
+              <a:buSzPts val="2000"/>
+            </a:pPr>
+            <a:endParaRPr lang="en-US" sz="2400" dirty="0">
+              <a:latin typeface="Roboto"/>
+              <a:ea typeface="Roboto"/>
+            </a:endParaRPr>
+          </a:p>
+          <a:p>
+            <a:pPr indent="-12700">
+              <a:buSzPts val="2000"/>
+              <a:buFont typeface="Noto Sans Symbols"/>
+              <a:buChar char="▪"/>
+            </a:pPr>
+            <a:r>
+              <a:rPr lang="en-US" sz="2400" dirty="0">
+                <a:latin typeface="Roboto"/>
+                <a:ea typeface="Roboto"/>
+                <a:sym typeface="Roboto"/>
+              </a:rPr>
+              <a:t> </a:t>
+            </a:r>
+            <a:r>
+              <a:rPr lang="en-US" sz="2400" b="1" dirty="0">
+                <a:latin typeface="Roboto"/>
+                <a:ea typeface="Roboto"/>
+                <a:sym typeface="Roboto"/>
+              </a:rPr>
+              <a:t>Fluent API </a:t>
+            </a:r>
+            <a:r>
+              <a:rPr lang="en-US" sz="2400" dirty="0">
+                <a:latin typeface="Roboto"/>
+                <a:ea typeface="Roboto"/>
+                <a:sym typeface="Roboto"/>
+              </a:rPr>
+              <a:t>– </a:t>
+            </a:r>
+            <a:r>
+              <a:rPr lang="ru-RU" sz="2400" dirty="0">
+                <a:latin typeface="Roboto"/>
+                <a:ea typeface="Roboto"/>
+                <a:sym typeface="Roboto"/>
+              </a:rPr>
+              <a:t>это средство конфигурации модели в </a:t>
+            </a:r>
+            <a:r>
+              <a:rPr lang="en-US" sz="2400" dirty="0">
+                <a:latin typeface="Roboto"/>
+                <a:ea typeface="Roboto"/>
+                <a:sym typeface="Roboto"/>
+              </a:rPr>
+              <a:t>EF Core, </a:t>
+            </a:r>
+            <a:r>
+              <a:rPr lang="ru-RU" sz="2400" dirty="0">
+                <a:latin typeface="Roboto"/>
+                <a:ea typeface="Roboto"/>
+                <a:sym typeface="Roboto"/>
+              </a:rPr>
+              <a:t>которое предоставляет более широкий набор функционала чем аннотация данных. Оба подхода могут использоваться вместе.</a:t>
+            </a:r>
+          </a:p>
+          <a:p>
+            <a:pPr indent="-12700">
+              <a:buSzPts val="2000"/>
+              <a:buFont typeface="Noto Sans Symbols"/>
+              <a:buChar char="▪"/>
+            </a:pPr>
+            <a:endParaRPr lang="en-US" sz="2400" dirty="0">
+              <a:latin typeface="Roboto"/>
+              <a:ea typeface="Roboto"/>
+              <a:sym typeface="Calibri"/>
+            </a:endParaRPr>
+          </a:p>
+          <a:p>
+            <a:pPr indent="-12700">
+              <a:buSzPts val="2000"/>
+              <a:buFont typeface="Noto Sans Symbols"/>
+              <a:buChar char="▪"/>
+            </a:pPr>
+            <a:r>
+              <a:rPr lang="en-US" sz="2400" dirty="0">
+                <a:latin typeface="Roboto"/>
+                <a:ea typeface="Roboto"/>
+              </a:rPr>
+              <a:t> </a:t>
+            </a:r>
+            <a:r>
+              <a:rPr lang="ru-RU" sz="2400" dirty="0">
+                <a:latin typeface="Roboto"/>
+                <a:ea typeface="Roboto"/>
+              </a:rPr>
+              <a:t>Конфигурация </a:t>
+            </a:r>
+            <a:r>
+              <a:rPr lang="en-US" sz="2400" dirty="0">
+                <a:latin typeface="Roboto"/>
+                <a:ea typeface="Roboto"/>
+              </a:rPr>
+              <a:t>Fluent API </a:t>
+            </a:r>
+            <a:r>
+              <a:rPr lang="ru-RU" sz="2400" dirty="0">
+                <a:latin typeface="Roboto"/>
+                <a:ea typeface="Roboto"/>
+              </a:rPr>
+              <a:t>описывается в методе </a:t>
+            </a:r>
+            <a:r>
+              <a:rPr lang="en-US" sz="2400" dirty="0" err="1">
+                <a:latin typeface="Roboto"/>
+                <a:ea typeface="Roboto"/>
+              </a:rPr>
+              <a:t>OnModelCreating</a:t>
+            </a:r>
+            <a:r>
+              <a:rPr lang="en-US" sz="2400" dirty="0">
+                <a:latin typeface="Roboto"/>
+                <a:ea typeface="Roboto"/>
+              </a:rPr>
+              <a:t>()</a:t>
+            </a:r>
+            <a:r>
+              <a:rPr lang="ru-RU" sz="2400" dirty="0">
+                <a:latin typeface="Roboto"/>
+                <a:ea typeface="Roboto"/>
+              </a:rPr>
+              <a:t>.</a:t>
+            </a:r>
+            <a:r>
+              <a:rPr lang="en-US" sz="2400" dirty="0">
+                <a:latin typeface="Roboto"/>
+                <a:ea typeface="Roboto"/>
+              </a:rPr>
+              <a:t> </a:t>
+            </a:r>
+            <a:endParaRPr lang="ru-RU" sz="2400" dirty="0">
+              <a:latin typeface="Roboto"/>
+              <a:ea typeface="Roboto"/>
+              <a:sym typeface="Calibri"/>
+            </a:endParaRPr>
+          </a:p>
+          <a:p>
+            <a:pPr lvl="0" indent="-12700">
+              <a:buSzPts val="2000"/>
+              <a:buFont typeface="Noto Sans Symbols"/>
+              <a:buChar char="▪"/>
+            </a:pPr>
+            <a:endParaRPr sz="2400" dirty="0">
+              <a:latin typeface="Roboto"/>
+              <a:ea typeface="Roboto"/>
+              <a:sym typeface="Roboto"/>
+            </a:endParaRPr>
+          </a:p>
+        </p:txBody>
+      </p:sp>
+    </p:spTree>
+    <p:extLst>
+      <p:ext uri="{BB962C8B-B14F-4D97-AF65-F5344CB8AC3E}">
+        <p14:creationId xmlns:p14="http://schemas.microsoft.com/office/powerpoint/2010/main" val="2666500928"/>
       </p:ext>
     </p:extLst>
   </p:cSld>

</xml_diff>